<commit_message>
Added conclusions and demo screenshots
</commit_message>
<xml_diff>
--- a/doc/pres3/wk12-progress.pptx
+++ b/doc/pres3/wk12-progress.pptx
@@ -5,10 +5,10 @@
     <p:sldMasterId id="2147483648" r:id="rId1"/>
   </p:sldMasterIdLst>
   <p:notesMasterIdLst>
-    <p:notesMasterId r:id="rId25"/>
+    <p:notesMasterId r:id="rId28"/>
   </p:notesMasterIdLst>
   <p:handoutMasterIdLst>
-    <p:handoutMasterId r:id="rId26"/>
+    <p:handoutMasterId r:id="rId29"/>
   </p:handoutMasterIdLst>
   <p:sldIdLst>
     <p:sldId id="256" r:id="rId2"/>
@@ -17,23 +17,26 @@
     <p:sldId id="264" r:id="rId5"/>
     <p:sldId id="311" r:id="rId6"/>
     <p:sldId id="312" r:id="rId7"/>
-    <p:sldId id="313" r:id="rId8"/>
-    <p:sldId id="308" r:id="rId9"/>
-    <p:sldId id="309" r:id="rId10"/>
-    <p:sldId id="310" r:id="rId11"/>
-    <p:sldId id="316" r:id="rId12"/>
-    <p:sldId id="314" r:id="rId13"/>
-    <p:sldId id="298" r:id="rId14"/>
-    <p:sldId id="315" r:id="rId15"/>
-    <p:sldId id="301" r:id="rId16"/>
-    <p:sldId id="302" r:id="rId17"/>
-    <p:sldId id="284" r:id="rId18"/>
-    <p:sldId id="293" r:id="rId19"/>
-    <p:sldId id="317" r:id="rId20"/>
-    <p:sldId id="318" r:id="rId21"/>
-    <p:sldId id="319" r:id="rId22"/>
-    <p:sldId id="306" r:id="rId23"/>
-    <p:sldId id="272" r:id="rId24"/>
+    <p:sldId id="320" r:id="rId8"/>
+    <p:sldId id="322" r:id="rId9"/>
+    <p:sldId id="308" r:id="rId10"/>
+    <p:sldId id="309" r:id="rId11"/>
+    <p:sldId id="310" r:id="rId12"/>
+    <p:sldId id="284" r:id="rId13"/>
+    <p:sldId id="325" r:id="rId14"/>
+    <p:sldId id="317" r:id="rId15"/>
+    <p:sldId id="326" r:id="rId16"/>
+    <p:sldId id="316" r:id="rId17"/>
+    <p:sldId id="323" r:id="rId18"/>
+    <p:sldId id="327" r:id="rId19"/>
+    <p:sldId id="314" r:id="rId20"/>
+    <p:sldId id="298" r:id="rId21"/>
+    <p:sldId id="315" r:id="rId22"/>
+    <p:sldId id="301" r:id="rId23"/>
+    <p:sldId id="302" r:id="rId24"/>
+    <p:sldId id="319" r:id="rId25"/>
+    <p:sldId id="306" r:id="rId26"/>
+    <p:sldId id="272" r:id="rId27"/>
   </p:sldIdLst>
   <p:sldSz cx="9144000" cy="6858000" type="screen4x3"/>
   <p:notesSz cx="6858000" cy="9144000"/>
@@ -309,7 +312,7 @@
     </p:spTree>
     <p:extLst>
       <p:ext uri="{BB962C8B-B14F-4D97-AF65-F5344CB8AC3E}">
-        <p14:creationId xmlns:p14="http://schemas.microsoft.com/office/powerpoint/2010/main" xmlns="" val="1901348598"/>
+        <p14:creationId xmlns="" xmlns:p14="http://schemas.microsoft.com/office/powerpoint/2010/main" val="1901348598"/>
       </p:ext>
     </p:extLst>
   </p:cSld>
@@ -571,7 +574,7 @@
     </p:spTree>
     <p:extLst>
       <p:ext uri="{BB962C8B-B14F-4D97-AF65-F5344CB8AC3E}">
-        <p14:creationId xmlns:p14="http://schemas.microsoft.com/office/powerpoint/2010/main" xmlns="" val="1219798393"/>
+        <p14:creationId xmlns="" xmlns:p14="http://schemas.microsoft.com/office/powerpoint/2010/main" val="1219798393"/>
       </p:ext>
     </p:extLst>
   </p:cSld>
@@ -884,14 +887,6 @@
 <file path=ppt/notesSlides/notesSlide4.xml><?xml version="1.0" encoding="utf-8"?>
 <p:notes xmlns:a="http://schemas.openxmlformats.org/drawingml/2006/main" xmlns:r="http://schemas.openxmlformats.org/officeDocument/2006/relationships" xmlns:p="http://schemas.openxmlformats.org/presentationml/2006/main">
   <p:cSld>
-    <p:bg>
-      <p:bgPr>
-        <a:solidFill>
-          <a:srgbClr val="FFFFFF"/>
-        </a:solidFill>
-        <a:effectLst/>
-      </p:bgPr>
-    </p:bg>
     <p:spTree>
       <p:nvGrpSpPr>
         <p:cNvPr id="1" name=""/>
@@ -908,83 +903,66 @@
       </p:grpSpPr>
       <p:sp>
         <p:nvSpPr>
-          <p:cNvPr id="8194" name="Rectangle 6"/>
-          <p:cNvSpPr>
-            <a:spLocks noGrp="1" noChangeArrowheads="1"/>
-          </p:cNvSpPr>
-          <p:nvPr>
-            <p:ph type="sldNum" sz="quarter"/>
-          </p:nvPr>
-        </p:nvSpPr>
-        <p:spPr>
-          <a:noFill/>
-          <a:ln>
-            <a:round/>
-            <a:headEnd/>
-            <a:tailEnd/>
-          </a:ln>
-        </p:spPr>
+          <p:cNvPr id="2" name="Slide Image Placeholder 1"/>
+          <p:cNvSpPr>
+            <a:spLocks noGrp="1" noRot="1" noChangeAspect="1"/>
+          </p:cNvSpPr>
+          <p:nvPr>
+            <p:ph type="sldImg"/>
+          </p:nvPr>
+        </p:nvSpPr>
+        <p:spPr/>
+      </p:sp>
+      <p:sp>
+        <p:nvSpPr>
+          <p:cNvPr id="3" name="Notes Placeholder 2"/>
+          <p:cNvSpPr>
+            <a:spLocks noGrp="1"/>
+          </p:cNvSpPr>
+          <p:nvPr>
+            <p:ph type="body" idx="1"/>
+          </p:nvPr>
+        </p:nvSpPr>
+        <p:spPr/>
+        <p:txBody>
+          <a:bodyPr>
+            <a:normAutofit/>
+          </a:bodyPr>
+          <a:lstStyle/>
+          <a:p>
+            <a:r>
+              <a:rPr lang="en-GB" dirty="0" smtClean="0"/>
+              <a:t>Note: run low task group</a:t>
+            </a:r>
+            <a:r>
+              <a:rPr lang="en-GB" baseline="0" dirty="0" smtClean="0"/>
+              <a:t> before high group</a:t>
+            </a:r>
+            <a:endParaRPr lang="en-GB" dirty="0"/>
+          </a:p>
+        </p:txBody>
+      </p:sp>
+      <p:sp>
+        <p:nvSpPr>
+          <p:cNvPr id="4" name="Slide Number Placeholder 3"/>
+          <p:cNvSpPr>
+            <a:spLocks noGrp="1"/>
+          </p:cNvSpPr>
+          <p:nvPr>
+            <p:ph type="sldNum" sz="quarter" idx="10"/>
+          </p:nvPr>
+        </p:nvSpPr>
+        <p:spPr/>
         <p:txBody>
           <a:bodyPr/>
           <a:lstStyle/>
           <a:p>
-            <a:fld id="{CCAD5623-98A6-4E02-894D-852ACC6F999A}" type="slidenum">
-              <a:rPr lang="en-GB"/>
+            <a:fld id="{75AC83F9-B412-4659-B1AB-C5ADB3A69EE4}" type="slidenum">
+              <a:rPr lang="en-GB" smtClean="0"/>
               <a:pPr/>
               <a:t>8</a:t>
             </a:fld>
             <a:endParaRPr lang="en-GB"/>
-          </a:p>
-        </p:txBody>
-      </p:sp>
-      <p:sp>
-        <p:nvSpPr>
-          <p:cNvPr id="8195" name="Rectangle 1"/>
-          <p:cNvSpPr txBox="1">
-            <a:spLocks noGrp="1" noRot="1" noChangeAspect="1" noChangeArrowheads="1" noTextEdit="1"/>
-          </p:cNvSpPr>
-          <p:nvPr>
-            <p:ph type="sldImg"/>
-          </p:nvPr>
-        </p:nvSpPr>
-        <p:spPr>
-          <a:xfrm>
-            <a:off x="1143000" y="695325"/>
-            <a:ext cx="4570413" cy="3427413"/>
-          </a:xfrm>
-          <a:solidFill>
-            <a:srgbClr val="FFFFFF"/>
-          </a:solidFill>
-          <a:ln>
-            <a:solidFill>
-              <a:srgbClr val="000000"/>
-            </a:solidFill>
-            <a:miter lim="800000"/>
-          </a:ln>
-        </p:spPr>
-      </p:sp>
-      <p:sp>
-        <p:nvSpPr>
-          <p:cNvPr id="8196" name="Rectangle 2"/>
-          <p:cNvSpPr txBox="1">
-            <a:spLocks noGrp="1" noChangeArrowheads="1"/>
-          </p:cNvSpPr>
-          <p:nvPr>
-            <p:ph type="body" idx="1"/>
-          </p:nvPr>
-        </p:nvSpPr>
-        <p:spPr>
-          <a:xfrm>
-            <a:off x="685512" y="4343230"/>
-            <a:ext cx="5486976" cy="4115139"/>
-          </a:xfrm>
-          <a:noFill/>
-        </p:spPr>
-        <p:txBody>
-          <a:bodyPr wrap="none" anchor="ctr"/>
-          <a:lstStyle/>
-          <a:p>
-            <a:endParaRPr lang="en-US" smtClean="0"/>
           </a:p>
         </p:txBody>
       </p:sp>
@@ -1023,7 +1001,7 @@
       </p:grpSpPr>
       <p:sp>
         <p:nvSpPr>
-          <p:cNvPr id="9218" name="Rectangle 6"/>
+          <p:cNvPr id="8194" name="Rectangle 6"/>
           <p:cNvSpPr>
             <a:spLocks noGrp="1" noChangeArrowheads="1"/>
           </p:cNvSpPr>
@@ -1043,7 +1021,7 @@
           <a:bodyPr/>
           <a:lstStyle/>
           <a:p>
-            <a:fld id="{B7D4883F-3F0C-4B0D-AAD2-7EB59A04E56D}" type="slidenum">
+            <a:fld id="{CCAD5623-98A6-4E02-894D-852ACC6F999A}" type="slidenum">
               <a:rPr lang="en-GB"/>
               <a:pPr/>
               <a:t>9</a:t>
@@ -1054,7 +1032,7 @@
       </p:sp>
       <p:sp>
         <p:nvSpPr>
-          <p:cNvPr id="9219" name="Rectangle 1"/>
+          <p:cNvPr id="8195" name="Rectangle 1"/>
           <p:cNvSpPr txBox="1">
             <a:spLocks noGrp="1" noRot="1" noChangeAspect="1" noChangeArrowheads="1" noTextEdit="1"/>
           </p:cNvSpPr>
@@ -1080,7 +1058,7 @@
       </p:sp>
       <p:sp>
         <p:nvSpPr>
-          <p:cNvPr id="9220" name="Rectangle 2"/>
+          <p:cNvPr id="8196" name="Rectangle 2"/>
           <p:cNvSpPr txBox="1">
             <a:spLocks noGrp="1" noChangeArrowheads="1"/>
           </p:cNvSpPr>
@@ -1099,7 +1077,15 @@
           <a:bodyPr wrap="none" anchor="ctr"/>
           <a:lstStyle/>
           <a:p>
-            <a:endParaRPr lang="en-US" smtClean="0"/>
+            <a:r>
+              <a:rPr lang="en-US" dirty="0" smtClean="0"/>
+              <a:t>Not deployed reasons</a:t>
+            </a:r>
+            <a:r>
+              <a:rPr lang="en-US" baseline="0" dirty="0" smtClean="0"/>
+              <a:t> explained later</a:t>
+            </a:r>
+            <a:endParaRPr lang="en-US" dirty="0" smtClean="0"/>
           </a:p>
         </p:txBody>
       </p:sp>
@@ -1138,7 +1124,7 @@
       </p:grpSpPr>
       <p:sp>
         <p:nvSpPr>
-          <p:cNvPr id="10242" name="Rectangle 6"/>
+          <p:cNvPr id="9218" name="Rectangle 6"/>
           <p:cNvSpPr>
             <a:spLocks noGrp="1" noChangeArrowheads="1"/>
           </p:cNvSpPr>
@@ -1158,7 +1144,7 @@
           <a:bodyPr/>
           <a:lstStyle/>
           <a:p>
-            <a:fld id="{7653BA33-BA82-47E2-B4DE-C263529ED7FE}" type="slidenum">
+            <a:fld id="{B7D4883F-3F0C-4B0D-AAD2-7EB59A04E56D}" type="slidenum">
               <a:rPr lang="en-GB"/>
               <a:pPr/>
               <a:t>10</a:t>
@@ -1169,7 +1155,7 @@
       </p:sp>
       <p:sp>
         <p:nvSpPr>
-          <p:cNvPr id="10243" name="Rectangle 1"/>
+          <p:cNvPr id="9219" name="Rectangle 1"/>
           <p:cNvSpPr txBox="1">
             <a:spLocks noGrp="1" noRot="1" noChangeAspect="1" noChangeArrowheads="1" noTextEdit="1"/>
           </p:cNvSpPr>
@@ -1195,7 +1181,7 @@
       </p:sp>
       <p:sp>
         <p:nvSpPr>
-          <p:cNvPr id="10244" name="Rectangle 2"/>
+          <p:cNvPr id="9220" name="Rectangle 2"/>
           <p:cNvSpPr txBox="1">
             <a:spLocks noGrp="1" noChangeArrowheads="1"/>
           </p:cNvSpPr>
@@ -1227,6 +1213,121 @@
 </file>
 
 <file path=ppt/notesSlides/notesSlide7.xml><?xml version="1.0" encoding="utf-8"?>
+<p:notes xmlns:a="http://schemas.openxmlformats.org/drawingml/2006/main" xmlns:r="http://schemas.openxmlformats.org/officeDocument/2006/relationships" xmlns:p="http://schemas.openxmlformats.org/presentationml/2006/main">
+  <p:cSld>
+    <p:bg>
+      <p:bgPr>
+        <a:solidFill>
+          <a:srgbClr val="FFFFFF"/>
+        </a:solidFill>
+        <a:effectLst/>
+      </p:bgPr>
+    </p:bg>
+    <p:spTree>
+      <p:nvGrpSpPr>
+        <p:cNvPr id="1" name=""/>
+        <p:cNvGrpSpPr/>
+        <p:nvPr/>
+      </p:nvGrpSpPr>
+      <p:grpSpPr>
+        <a:xfrm>
+          <a:off x="0" y="0"/>
+          <a:ext cx="0" cy="0"/>
+          <a:chOff x="0" y="0"/>
+          <a:chExt cx="0" cy="0"/>
+        </a:xfrm>
+      </p:grpSpPr>
+      <p:sp>
+        <p:nvSpPr>
+          <p:cNvPr id="10242" name="Rectangle 6"/>
+          <p:cNvSpPr>
+            <a:spLocks noGrp="1" noChangeArrowheads="1"/>
+          </p:cNvSpPr>
+          <p:nvPr>
+            <p:ph type="sldNum" sz="quarter"/>
+          </p:nvPr>
+        </p:nvSpPr>
+        <p:spPr>
+          <a:noFill/>
+          <a:ln>
+            <a:round/>
+            <a:headEnd/>
+            <a:tailEnd/>
+          </a:ln>
+        </p:spPr>
+        <p:txBody>
+          <a:bodyPr/>
+          <a:lstStyle/>
+          <a:p>
+            <a:fld id="{7653BA33-BA82-47E2-B4DE-C263529ED7FE}" type="slidenum">
+              <a:rPr lang="en-GB"/>
+              <a:pPr/>
+              <a:t>11</a:t>
+            </a:fld>
+            <a:endParaRPr lang="en-GB"/>
+          </a:p>
+        </p:txBody>
+      </p:sp>
+      <p:sp>
+        <p:nvSpPr>
+          <p:cNvPr id="10243" name="Rectangle 1"/>
+          <p:cNvSpPr txBox="1">
+            <a:spLocks noGrp="1" noRot="1" noChangeAspect="1" noChangeArrowheads="1" noTextEdit="1"/>
+          </p:cNvSpPr>
+          <p:nvPr>
+            <p:ph type="sldImg"/>
+          </p:nvPr>
+        </p:nvSpPr>
+        <p:spPr>
+          <a:xfrm>
+            <a:off x="1143000" y="695325"/>
+            <a:ext cx="4570413" cy="3427413"/>
+          </a:xfrm>
+          <a:solidFill>
+            <a:srgbClr val="FFFFFF"/>
+          </a:solidFill>
+          <a:ln>
+            <a:solidFill>
+              <a:srgbClr val="000000"/>
+            </a:solidFill>
+            <a:miter lim="800000"/>
+          </a:ln>
+        </p:spPr>
+      </p:sp>
+      <p:sp>
+        <p:nvSpPr>
+          <p:cNvPr id="10244" name="Rectangle 2"/>
+          <p:cNvSpPr txBox="1">
+            <a:spLocks noGrp="1" noChangeArrowheads="1"/>
+          </p:cNvSpPr>
+          <p:nvPr>
+            <p:ph type="body" idx="1"/>
+          </p:nvPr>
+        </p:nvSpPr>
+        <p:spPr>
+          <a:xfrm>
+            <a:off x="685512" y="4343230"/>
+            <a:ext cx="5486976" cy="4115139"/>
+          </a:xfrm>
+          <a:noFill/>
+        </p:spPr>
+        <p:txBody>
+          <a:bodyPr wrap="none" anchor="ctr"/>
+          <a:lstStyle/>
+          <a:p>
+            <a:endParaRPr lang="en-US" smtClean="0"/>
+          </a:p>
+        </p:txBody>
+      </p:sp>
+    </p:spTree>
+  </p:cSld>
+  <p:clrMapOvr>
+    <a:masterClrMapping/>
+  </p:clrMapOvr>
+</p:notes>
+</file>
+
+<file path=ppt/notesSlides/notesSlide8.xml><?xml version="1.0" encoding="utf-8"?>
 <p:notes xmlns:a="http://schemas.openxmlformats.org/drawingml/2006/main" xmlns:r="http://schemas.openxmlformats.org/officeDocument/2006/relationships" xmlns:p="http://schemas.openxmlformats.org/presentationml/2006/main">
   <p:cSld>
     <p:spTree>
@@ -1274,13 +1375,24 @@
           <a:p>
             <a:r>
               <a:rPr lang="en-GB" dirty="0" smtClean="0"/>
-              <a:t>Gantt</a:t>
+              <a:t>Mention specific</a:t>
             </a:r>
             <a:r>
               <a:rPr lang="en-GB" baseline="0" dirty="0" smtClean="0"/>
-              <a:t> charts handed out, high level plans explained in next two slides</a:t>
-            </a:r>
-            <a:endParaRPr lang="en-GB" dirty="0"/>
+              <a:t> malware scanners</a:t>
+            </a:r>
+            <a:endParaRPr lang="en-GB" dirty="0" smtClean="0"/>
+          </a:p>
+          <a:p>
+            <a:r>
+              <a:rPr lang="en-GB" dirty="0" smtClean="0"/>
+              <a:t>Some bugs</a:t>
+            </a:r>
+            <a:r>
+              <a:rPr lang="en-GB" baseline="0" dirty="0" smtClean="0"/>
+              <a:t> apparent with longer test runs</a:t>
+            </a:r>
+            <a:endParaRPr lang="en-GB" dirty="0" smtClean="0"/>
           </a:p>
         </p:txBody>
       </p:sp>
@@ -1303,6 +1415,96 @@
               <a:rPr lang="en-GB" smtClean="0"/>
               <a:pPr/>
               <a:t>12</a:t>
+            </a:fld>
+            <a:endParaRPr lang="en-GB"/>
+          </a:p>
+        </p:txBody>
+      </p:sp>
+    </p:spTree>
+  </p:cSld>
+  <p:clrMapOvr>
+    <a:masterClrMapping/>
+  </p:clrMapOvr>
+</p:notes>
+</file>
+
+<file path=ppt/notesSlides/notesSlide9.xml><?xml version="1.0" encoding="utf-8"?>
+<p:notes xmlns:a="http://schemas.openxmlformats.org/drawingml/2006/main" xmlns:r="http://schemas.openxmlformats.org/officeDocument/2006/relationships" xmlns:p="http://schemas.openxmlformats.org/presentationml/2006/main">
+  <p:cSld>
+    <p:spTree>
+      <p:nvGrpSpPr>
+        <p:cNvPr id="1" name=""/>
+        <p:cNvGrpSpPr/>
+        <p:nvPr/>
+      </p:nvGrpSpPr>
+      <p:grpSpPr>
+        <a:xfrm>
+          <a:off x="0" y="0"/>
+          <a:ext cx="0" cy="0"/>
+          <a:chOff x="0" y="0"/>
+          <a:chExt cx="0" cy="0"/>
+        </a:xfrm>
+      </p:grpSpPr>
+      <p:sp>
+        <p:nvSpPr>
+          <p:cNvPr id="2" name="Slide Image Placeholder 1"/>
+          <p:cNvSpPr>
+            <a:spLocks noGrp="1" noRot="1" noChangeAspect="1"/>
+          </p:cNvSpPr>
+          <p:nvPr>
+            <p:ph type="sldImg"/>
+          </p:nvPr>
+        </p:nvSpPr>
+        <p:spPr/>
+      </p:sp>
+      <p:sp>
+        <p:nvSpPr>
+          <p:cNvPr id="3" name="Notes Placeholder 2"/>
+          <p:cNvSpPr>
+            <a:spLocks noGrp="1"/>
+          </p:cNvSpPr>
+          <p:nvPr>
+            <p:ph type="body" idx="1"/>
+          </p:nvPr>
+        </p:nvSpPr>
+        <p:spPr/>
+        <p:txBody>
+          <a:bodyPr>
+            <a:normAutofit/>
+          </a:bodyPr>
+          <a:lstStyle/>
+          <a:p>
+            <a:r>
+              <a:rPr lang="en-GB" dirty="0" smtClean="0"/>
+              <a:t>Gantt</a:t>
+            </a:r>
+            <a:r>
+              <a:rPr lang="en-GB" baseline="0" dirty="0" smtClean="0"/>
+              <a:t> charts handed out, high level plans explained in next two slides</a:t>
+            </a:r>
+            <a:endParaRPr lang="en-GB" dirty="0"/>
+          </a:p>
+        </p:txBody>
+      </p:sp>
+      <p:sp>
+        <p:nvSpPr>
+          <p:cNvPr id="4" name="Slide Number Placeholder 3"/>
+          <p:cNvSpPr>
+            <a:spLocks noGrp="1"/>
+          </p:cNvSpPr>
+          <p:nvPr>
+            <p:ph type="sldNum" sz="quarter" idx="10"/>
+          </p:nvPr>
+        </p:nvSpPr>
+        <p:spPr/>
+        <p:txBody>
+          <a:bodyPr/>
+          <a:lstStyle/>
+          <a:p>
+            <a:fld id="{75AC83F9-B412-4659-B1AB-C5ADB3A69EE4}" type="slidenum">
+              <a:rPr lang="en-GB" smtClean="0"/>
+              <a:pPr/>
+              <a:t>19</a:t>
             </a:fld>
             <a:endParaRPr lang="en-GB"/>
           </a:p>
@@ -4426,7 +4628,7 @@
       </p:grpSpPr>
       <p:sp>
         <p:nvSpPr>
-          <p:cNvPr id="5122" name="Rectangle 1"/>
+          <p:cNvPr id="4098" name="Rectangle 1"/>
           <p:cNvSpPr>
             <a:spLocks noGrp="1" noChangeArrowheads="1"/>
           </p:cNvSpPr>
@@ -4469,7 +4671,7 @@
       </p:sp>
       <p:sp>
         <p:nvSpPr>
-          <p:cNvPr id="5123" name="Rectangle 2"/>
+          <p:cNvPr id="4099" name="Rectangle 2"/>
           <p:cNvSpPr>
             <a:spLocks noGrp="1" noChangeArrowheads="1"/>
           </p:cNvSpPr>
@@ -4479,8 +4681,8 @@
         </p:nvSpPr>
         <p:spPr>
           <a:xfrm>
-            <a:off x="456481" y="1604328"/>
-            <a:ext cx="8163360" cy="5057811"/>
+            <a:off x="456480" y="1604328"/>
+            <a:ext cx="8033760" cy="4666090"/>
           </a:xfrm>
         </p:spPr>
         <p:txBody>
@@ -4508,7 +4710,7 @@
             </a:pPr>
             <a:r>
               <a:rPr lang="en-GB" dirty="0" smtClean="0"/>
-              <a:t>High Interaction</a:t>
+              <a:t>Low Interaction</a:t>
             </a:r>
           </a:p>
           <a:p>
@@ -4533,7 +4735,7 @@
             </a:pPr>
             <a:r>
               <a:rPr lang="en-GB" dirty="0" smtClean="0"/>
-              <a:t>Capture-HPC</a:t>
+              <a:t>HTML Analysis</a:t>
             </a:r>
           </a:p>
           <a:p>
@@ -4558,7 +4760,36 @@
             </a:pPr>
             <a:r>
               <a:rPr lang="en-GB" dirty="0" smtClean="0"/>
-              <a:t>Virtual Machine based</a:t>
+              <a:t>Focus on the frequency of trending keywords in a webpage</a:t>
+            </a:r>
+          </a:p>
+          <a:p>
+            <a:pPr marL="783372" lvl="1" indent="-293764">
+              <a:buSzPct val="75000"/>
+              <a:buFont typeface="Symbol" charset="2"/>
+              <a:buChar char=""/>
+              <a:tabLst>
+                <a:tab pos="656650" algn="l"/>
+                <a:tab pos="1313299" algn="l"/>
+                <a:tab pos="1969949" algn="l"/>
+                <a:tab pos="2626599" algn="l"/>
+                <a:tab pos="3283248" algn="l"/>
+                <a:tab pos="3939898" algn="l"/>
+                <a:tab pos="4596548" algn="l"/>
+                <a:tab pos="5253198" algn="l"/>
+                <a:tab pos="5909847" algn="l"/>
+                <a:tab pos="6566497" algn="l"/>
+                <a:tab pos="7223147" algn="l"/>
+                <a:tab pos="7879796" algn="l"/>
+              </a:tabLst>
+            </a:pPr>
+            <a:r>
+              <a:rPr lang="en-GB" dirty="0" err="1" smtClean="0"/>
+              <a:t>ClamAV</a:t>
+            </a:r>
+            <a:r>
+              <a:rPr lang="en-GB" dirty="0" smtClean="0"/>
+              <a:t> Malware Scan</a:t>
             </a:r>
           </a:p>
           <a:p>
@@ -4583,7 +4814,7 @@
             </a:pPr>
             <a:r>
               <a:rPr lang="en-GB" dirty="0" smtClean="0"/>
-              <a:t>Accurate simulation of user browsing</a:t>
+              <a:t>Signature based detection</a:t>
             </a:r>
           </a:p>
           <a:p>
@@ -4608,107 +4839,7 @@
             </a:pPr>
             <a:r>
               <a:rPr lang="en-GB" dirty="0" smtClean="0"/>
-              <a:t>Low URL throughput (slow processing)</a:t>
-            </a:r>
-          </a:p>
-          <a:p>
-            <a:pPr marL="783372" lvl="1" indent="-293764">
-              <a:buSzPct val="75000"/>
-              <a:buFont typeface="Symbol" charset="2"/>
-              <a:buChar char=""/>
-              <a:tabLst>
-                <a:tab pos="656650" algn="l"/>
-                <a:tab pos="1313299" algn="l"/>
-                <a:tab pos="1969949" algn="l"/>
-                <a:tab pos="2626599" algn="l"/>
-                <a:tab pos="3283248" algn="l"/>
-                <a:tab pos="3939898" algn="l"/>
-                <a:tab pos="4596548" algn="l"/>
-                <a:tab pos="5253198" algn="l"/>
-                <a:tab pos="5909847" algn="l"/>
-                <a:tab pos="6566497" algn="l"/>
-                <a:tab pos="7223147" algn="l"/>
-                <a:tab pos="7879796" algn="l"/>
-              </a:tabLst>
-            </a:pPr>
-            <a:r>
-              <a:rPr lang="en-GB" dirty="0" smtClean="0"/>
-              <a:t>Wine Explorer</a:t>
-            </a:r>
-          </a:p>
-          <a:p>
-            <a:pPr marL="1175057" lvl="2" indent="-260644">
-              <a:buSzPct val="45000"/>
-              <a:buFont typeface="Wingdings" charset="2"/>
-              <a:buChar char=""/>
-              <a:tabLst>
-                <a:tab pos="656650" algn="l"/>
-                <a:tab pos="1313299" algn="l"/>
-                <a:tab pos="1969949" algn="l"/>
-                <a:tab pos="2626599" algn="l"/>
-                <a:tab pos="3283248" algn="l"/>
-                <a:tab pos="3939898" algn="l"/>
-                <a:tab pos="4596548" algn="l"/>
-                <a:tab pos="5253198" algn="l"/>
-                <a:tab pos="5909847" algn="l"/>
-                <a:tab pos="6566497" algn="l"/>
-                <a:tab pos="7223147" algn="l"/>
-                <a:tab pos="7879796" algn="l"/>
-              </a:tabLst>
-            </a:pPr>
-            <a:r>
-              <a:rPr lang="en-GB" dirty="0" smtClean="0"/>
-              <a:t>Internet Explorer under Wine</a:t>
-            </a:r>
-          </a:p>
-          <a:p>
-            <a:pPr marL="1175057" lvl="2" indent="-260644">
-              <a:buSzPct val="45000"/>
-              <a:buFont typeface="Wingdings" charset="2"/>
-              <a:buChar char=""/>
-              <a:tabLst>
-                <a:tab pos="656650" algn="l"/>
-                <a:tab pos="1313299" algn="l"/>
-                <a:tab pos="1969949" algn="l"/>
-                <a:tab pos="2626599" algn="l"/>
-                <a:tab pos="3283248" algn="l"/>
-                <a:tab pos="3939898" algn="l"/>
-                <a:tab pos="4596548" algn="l"/>
-                <a:tab pos="5253198" algn="l"/>
-                <a:tab pos="5909847" algn="l"/>
-                <a:tab pos="6566497" algn="l"/>
-                <a:tab pos="7223147" algn="l"/>
-                <a:tab pos="7879796" algn="l"/>
-              </a:tabLst>
-            </a:pPr>
-            <a:r>
-              <a:rPr lang="en-GB" dirty="0" smtClean="0"/>
-              <a:t>Compatibility layer instead of VM</a:t>
-            </a:r>
-          </a:p>
-          <a:p>
-            <a:pPr marL="1175057" lvl="2" indent="-260644">
-              <a:buSzPct val="45000"/>
-              <a:buFont typeface="Wingdings" charset="2"/>
-              <a:buChar char=""/>
-              <a:tabLst>
-                <a:tab pos="656650" algn="l"/>
-                <a:tab pos="1313299" algn="l"/>
-                <a:tab pos="1969949" algn="l"/>
-                <a:tab pos="2626599" algn="l"/>
-                <a:tab pos="3283248" algn="l"/>
-                <a:tab pos="3939898" algn="l"/>
-                <a:tab pos="4596548" algn="l"/>
-                <a:tab pos="5253198" algn="l"/>
-                <a:tab pos="5909847" algn="l"/>
-                <a:tab pos="6566497" algn="l"/>
-                <a:tab pos="7223147" algn="l"/>
-                <a:tab pos="7879796" algn="l"/>
-              </a:tabLst>
-            </a:pPr>
-            <a:r>
-              <a:rPr lang="en-GB" dirty="0" smtClean="0"/>
-              <a:t>Resource saving, high URL throughput</a:t>
+              <a:t>Scans web pages and downloadable objects</a:t>
             </a:r>
           </a:p>
         </p:txBody>
@@ -4755,6 +4886,1048 @@
     <p:bg>
       <p:bgPr>
         <a:blipFill dpi="0" rotWithShape="1">
+          <a:blip r:embed="rId3" cstate="print">
+            <a:duotone>
+              <a:prstClr val="black"/>
+              <a:schemeClr val="accent3">
+                <a:tint val="45000"/>
+                <a:satMod val="400000"/>
+              </a:schemeClr>
+            </a:duotone>
+          </a:blip>
+          <a:srcRect/>
+          <a:stretch>
+            <a:fillRect l="-7000" r="-7000"/>
+          </a:stretch>
+        </a:blipFill>
+        <a:effectLst/>
+      </p:bgPr>
+    </p:bg>
+    <p:spTree>
+      <p:nvGrpSpPr>
+        <p:cNvPr id="1" name=""/>
+        <p:cNvGrpSpPr/>
+        <p:nvPr/>
+      </p:nvGrpSpPr>
+      <p:grpSpPr>
+        <a:xfrm>
+          <a:off x="0" y="0"/>
+          <a:ext cx="0" cy="0"/>
+          <a:chOff x="0" y="0"/>
+          <a:chExt cx="0" cy="0"/>
+        </a:xfrm>
+      </p:grpSpPr>
+      <p:sp>
+        <p:nvSpPr>
+          <p:cNvPr id="5122" name="Rectangle 1"/>
+          <p:cNvSpPr>
+            <a:spLocks noGrp="1" noChangeArrowheads="1"/>
+          </p:cNvSpPr>
+          <p:nvPr>
+            <p:ph type="title"/>
+          </p:nvPr>
+        </p:nvSpPr>
+        <p:spPr>
+          <a:xfrm>
+            <a:off x="456481" y="273629"/>
+            <a:ext cx="8228160" cy="1144921"/>
+          </a:xfrm>
+        </p:spPr>
+        <p:txBody>
+          <a:bodyPr/>
+          <a:lstStyle/>
+          <a:p>
+            <a:pPr>
+              <a:tabLst>
+                <a:tab pos="656650" algn="l"/>
+                <a:tab pos="1313299" algn="l"/>
+                <a:tab pos="1969949" algn="l"/>
+                <a:tab pos="2626599" algn="l"/>
+                <a:tab pos="3283248" algn="l"/>
+                <a:tab pos="3939898" algn="l"/>
+                <a:tab pos="4596548" algn="l"/>
+                <a:tab pos="5253198" algn="l"/>
+                <a:tab pos="5909847" algn="l"/>
+                <a:tab pos="6566497" algn="l"/>
+                <a:tab pos="7223147" algn="l"/>
+                <a:tab pos="7879796" algn="l"/>
+              </a:tabLst>
+            </a:pPr>
+            <a:r>
+              <a:rPr lang="en-GB" dirty="0" smtClean="0"/>
+              <a:t>Malware Detection Subsystems</a:t>
+            </a:r>
+          </a:p>
+        </p:txBody>
+      </p:sp>
+      <p:sp>
+        <p:nvSpPr>
+          <p:cNvPr id="5123" name="Rectangle 2"/>
+          <p:cNvSpPr>
+            <a:spLocks noGrp="1" noChangeArrowheads="1"/>
+          </p:cNvSpPr>
+          <p:nvPr>
+            <p:ph type="body" idx="1"/>
+          </p:nvPr>
+        </p:nvSpPr>
+        <p:spPr>
+          <a:xfrm>
+            <a:off x="456481" y="1604328"/>
+            <a:ext cx="8163360" cy="5057811"/>
+          </a:xfrm>
+        </p:spPr>
+        <p:txBody>
+          <a:bodyPr/>
+          <a:lstStyle/>
+          <a:p>
+            <a:pPr marL="391686" indent="-293764">
+              <a:buSzPct val="45000"/>
+              <a:buFont typeface="Wingdings" charset="2"/>
+              <a:buChar char=""/>
+              <a:tabLst>
+                <a:tab pos="656650" algn="l"/>
+                <a:tab pos="1313299" algn="l"/>
+                <a:tab pos="1969949" algn="l"/>
+                <a:tab pos="2626599" algn="l"/>
+                <a:tab pos="3283248" algn="l"/>
+                <a:tab pos="3939898" algn="l"/>
+                <a:tab pos="4596548" algn="l"/>
+                <a:tab pos="5253198" algn="l"/>
+                <a:tab pos="5909847" algn="l"/>
+                <a:tab pos="6566497" algn="l"/>
+                <a:tab pos="7223147" algn="l"/>
+                <a:tab pos="7879796" algn="l"/>
+              </a:tabLst>
+            </a:pPr>
+            <a:r>
+              <a:rPr lang="en-GB" dirty="0" smtClean="0"/>
+              <a:t>High Interaction</a:t>
+            </a:r>
+          </a:p>
+          <a:p>
+            <a:pPr marL="783372" lvl="1" indent="-293764">
+              <a:buSzPct val="75000"/>
+              <a:buFont typeface="Symbol" charset="2"/>
+              <a:buChar char=""/>
+              <a:tabLst>
+                <a:tab pos="656650" algn="l"/>
+                <a:tab pos="1313299" algn="l"/>
+                <a:tab pos="1969949" algn="l"/>
+                <a:tab pos="2626599" algn="l"/>
+                <a:tab pos="3283248" algn="l"/>
+                <a:tab pos="3939898" algn="l"/>
+                <a:tab pos="4596548" algn="l"/>
+                <a:tab pos="5253198" algn="l"/>
+                <a:tab pos="5909847" algn="l"/>
+                <a:tab pos="6566497" algn="l"/>
+                <a:tab pos="7223147" algn="l"/>
+                <a:tab pos="7879796" algn="l"/>
+              </a:tabLst>
+            </a:pPr>
+            <a:r>
+              <a:rPr lang="en-GB" dirty="0" smtClean="0"/>
+              <a:t>Capture-HPC</a:t>
+            </a:r>
+          </a:p>
+          <a:p>
+            <a:pPr marL="1175057" lvl="2" indent="-260644">
+              <a:buSzPct val="45000"/>
+              <a:buFont typeface="Wingdings" charset="2"/>
+              <a:buChar char=""/>
+              <a:tabLst>
+                <a:tab pos="656650" algn="l"/>
+                <a:tab pos="1313299" algn="l"/>
+                <a:tab pos="1969949" algn="l"/>
+                <a:tab pos="2626599" algn="l"/>
+                <a:tab pos="3283248" algn="l"/>
+                <a:tab pos="3939898" algn="l"/>
+                <a:tab pos="4596548" algn="l"/>
+                <a:tab pos="5253198" algn="l"/>
+                <a:tab pos="5909847" algn="l"/>
+                <a:tab pos="6566497" algn="l"/>
+                <a:tab pos="7223147" algn="l"/>
+                <a:tab pos="7879796" algn="l"/>
+              </a:tabLst>
+            </a:pPr>
+            <a:r>
+              <a:rPr lang="en-GB" dirty="0" smtClean="0"/>
+              <a:t>Virtual Machine based</a:t>
+            </a:r>
+          </a:p>
+          <a:p>
+            <a:pPr marL="1175057" lvl="2" indent="-260644">
+              <a:buSzPct val="45000"/>
+              <a:buFont typeface="Wingdings" charset="2"/>
+              <a:buChar char=""/>
+              <a:tabLst>
+                <a:tab pos="656650" algn="l"/>
+                <a:tab pos="1313299" algn="l"/>
+                <a:tab pos="1969949" algn="l"/>
+                <a:tab pos="2626599" algn="l"/>
+                <a:tab pos="3283248" algn="l"/>
+                <a:tab pos="3939898" algn="l"/>
+                <a:tab pos="4596548" algn="l"/>
+                <a:tab pos="5253198" algn="l"/>
+                <a:tab pos="5909847" algn="l"/>
+                <a:tab pos="6566497" algn="l"/>
+                <a:tab pos="7223147" algn="l"/>
+                <a:tab pos="7879796" algn="l"/>
+              </a:tabLst>
+            </a:pPr>
+            <a:r>
+              <a:rPr lang="en-GB" dirty="0" smtClean="0"/>
+              <a:t>Accurate simulation of user browsing</a:t>
+            </a:r>
+          </a:p>
+          <a:p>
+            <a:pPr marL="1175057" lvl="2" indent="-260644">
+              <a:buSzPct val="45000"/>
+              <a:buFont typeface="Wingdings" charset="2"/>
+              <a:buChar char=""/>
+              <a:tabLst>
+                <a:tab pos="656650" algn="l"/>
+                <a:tab pos="1313299" algn="l"/>
+                <a:tab pos="1969949" algn="l"/>
+                <a:tab pos="2626599" algn="l"/>
+                <a:tab pos="3283248" algn="l"/>
+                <a:tab pos="3939898" algn="l"/>
+                <a:tab pos="4596548" algn="l"/>
+                <a:tab pos="5253198" algn="l"/>
+                <a:tab pos="5909847" algn="l"/>
+                <a:tab pos="6566497" algn="l"/>
+                <a:tab pos="7223147" algn="l"/>
+                <a:tab pos="7879796" algn="l"/>
+              </a:tabLst>
+            </a:pPr>
+            <a:r>
+              <a:rPr lang="en-GB" dirty="0" smtClean="0"/>
+              <a:t>Low URL throughput (slow processing)</a:t>
+            </a:r>
+          </a:p>
+          <a:p>
+            <a:pPr marL="783372" lvl="1" indent="-293764">
+              <a:buSzPct val="75000"/>
+              <a:buFont typeface="Symbol" charset="2"/>
+              <a:buChar char=""/>
+              <a:tabLst>
+                <a:tab pos="656650" algn="l"/>
+                <a:tab pos="1313299" algn="l"/>
+                <a:tab pos="1969949" algn="l"/>
+                <a:tab pos="2626599" algn="l"/>
+                <a:tab pos="3283248" algn="l"/>
+                <a:tab pos="3939898" algn="l"/>
+                <a:tab pos="4596548" algn="l"/>
+                <a:tab pos="5253198" algn="l"/>
+                <a:tab pos="5909847" algn="l"/>
+                <a:tab pos="6566497" algn="l"/>
+                <a:tab pos="7223147" algn="l"/>
+                <a:tab pos="7879796" algn="l"/>
+              </a:tabLst>
+            </a:pPr>
+            <a:r>
+              <a:rPr lang="en-GB" dirty="0" smtClean="0"/>
+              <a:t>Wine Explorer</a:t>
+            </a:r>
+          </a:p>
+          <a:p>
+            <a:pPr marL="1175057" lvl="2" indent="-260644">
+              <a:buSzPct val="45000"/>
+              <a:buFont typeface="Wingdings" charset="2"/>
+              <a:buChar char=""/>
+              <a:tabLst>
+                <a:tab pos="656650" algn="l"/>
+                <a:tab pos="1313299" algn="l"/>
+                <a:tab pos="1969949" algn="l"/>
+                <a:tab pos="2626599" algn="l"/>
+                <a:tab pos="3283248" algn="l"/>
+                <a:tab pos="3939898" algn="l"/>
+                <a:tab pos="4596548" algn="l"/>
+                <a:tab pos="5253198" algn="l"/>
+                <a:tab pos="5909847" algn="l"/>
+                <a:tab pos="6566497" algn="l"/>
+                <a:tab pos="7223147" algn="l"/>
+                <a:tab pos="7879796" algn="l"/>
+              </a:tabLst>
+            </a:pPr>
+            <a:r>
+              <a:rPr lang="en-GB" dirty="0" smtClean="0"/>
+              <a:t>Internet Explorer under Wine</a:t>
+            </a:r>
+          </a:p>
+          <a:p>
+            <a:pPr marL="1175057" lvl="2" indent="-260644">
+              <a:buSzPct val="45000"/>
+              <a:buFont typeface="Wingdings" charset="2"/>
+              <a:buChar char=""/>
+              <a:tabLst>
+                <a:tab pos="656650" algn="l"/>
+                <a:tab pos="1313299" algn="l"/>
+                <a:tab pos="1969949" algn="l"/>
+                <a:tab pos="2626599" algn="l"/>
+                <a:tab pos="3283248" algn="l"/>
+                <a:tab pos="3939898" algn="l"/>
+                <a:tab pos="4596548" algn="l"/>
+                <a:tab pos="5253198" algn="l"/>
+                <a:tab pos="5909847" algn="l"/>
+                <a:tab pos="6566497" algn="l"/>
+                <a:tab pos="7223147" algn="l"/>
+                <a:tab pos="7879796" algn="l"/>
+              </a:tabLst>
+            </a:pPr>
+            <a:r>
+              <a:rPr lang="en-GB" dirty="0" smtClean="0"/>
+              <a:t>Compatibility layer instead of VM</a:t>
+            </a:r>
+          </a:p>
+          <a:p>
+            <a:pPr marL="1175057" lvl="2" indent="-260644">
+              <a:buSzPct val="45000"/>
+              <a:buFont typeface="Wingdings" charset="2"/>
+              <a:buChar char=""/>
+              <a:tabLst>
+                <a:tab pos="656650" algn="l"/>
+                <a:tab pos="1313299" algn="l"/>
+                <a:tab pos="1969949" algn="l"/>
+                <a:tab pos="2626599" algn="l"/>
+                <a:tab pos="3283248" algn="l"/>
+                <a:tab pos="3939898" algn="l"/>
+                <a:tab pos="4596548" algn="l"/>
+                <a:tab pos="5253198" algn="l"/>
+                <a:tab pos="5909847" algn="l"/>
+                <a:tab pos="6566497" algn="l"/>
+                <a:tab pos="7223147" algn="l"/>
+                <a:tab pos="7879796" algn="l"/>
+              </a:tabLst>
+            </a:pPr>
+            <a:r>
+              <a:rPr lang="en-GB" dirty="0" smtClean="0"/>
+              <a:t>Resource saving, high URL throughput</a:t>
+            </a:r>
+          </a:p>
+        </p:txBody>
+      </p:sp>
+    </p:spTree>
+  </p:cSld>
+  <p:clrMapOvr>
+    <a:masterClrMapping/>
+  </p:clrMapOvr>
+  <p:transition spd="med"/>
+  <p:timing>
+    <p:tnLst>
+      <p:par>
+        <p:cTn id="1" dur="indefinite" restart="never" nodeType="tmRoot">
+          <p:childTnLst>
+            <p:seq concurrent="1" nextAc="seek">
+              <p:cTn id="2" dur="0" nodeType="mainSeq"/>
+              <p:prevCondLst>
+                <p:cond evt="onPrev" delay="0">
+                  <p:tgtEl>
+                    <p:sldTgt/>
+                  </p:tgtEl>
+                </p:cond>
+              </p:prevCondLst>
+              <p:nextCondLst>
+                <p:cond evt="onNext" delay="0">
+                  <p:tgtEl>
+                    <p:sldTgt/>
+                  </p:tgtEl>
+                </p:cond>
+              </p:nextCondLst>
+            </p:seq>
+          </p:childTnLst>
+        </p:cTn>
+      </p:par>
+    </p:tnLst>
+  </p:timing>
+</p:sld>
+</file>
+
+<file path=ppt/slides/slide12.xml><?xml version="1.0" encoding="utf-8"?>
+<p:sld xmlns:a="http://schemas.openxmlformats.org/drawingml/2006/main" xmlns:r="http://schemas.openxmlformats.org/officeDocument/2006/relationships" xmlns:p="http://schemas.openxmlformats.org/presentationml/2006/main">
+  <p:cSld>
+    <p:bg>
+      <p:bgPr>
+        <a:blipFill dpi="0" rotWithShape="1">
+          <a:blip r:embed="rId3" cstate="print">
+            <a:duotone>
+              <a:prstClr val="black"/>
+              <a:schemeClr val="accent6">
+                <a:tint val="45000"/>
+                <a:satMod val="400000"/>
+              </a:schemeClr>
+            </a:duotone>
+          </a:blip>
+          <a:srcRect/>
+          <a:stretch>
+            <a:fillRect l="-7000" r="-7000"/>
+          </a:stretch>
+        </a:blipFill>
+        <a:effectLst/>
+      </p:bgPr>
+    </p:bg>
+    <p:spTree>
+      <p:nvGrpSpPr>
+        <p:cNvPr id="1" name=""/>
+        <p:cNvGrpSpPr/>
+        <p:nvPr/>
+      </p:nvGrpSpPr>
+      <p:grpSpPr>
+        <a:xfrm>
+          <a:off x="0" y="0"/>
+          <a:ext cx="0" cy="0"/>
+          <a:chOff x="0" y="0"/>
+          <a:chExt cx="0" cy="0"/>
+        </a:xfrm>
+      </p:grpSpPr>
+      <p:sp>
+        <p:nvSpPr>
+          <p:cNvPr id="2" name="Title 1"/>
+          <p:cNvSpPr>
+            <a:spLocks noGrp="1"/>
+          </p:cNvSpPr>
+          <p:nvPr>
+            <p:ph type="title"/>
+          </p:nvPr>
+        </p:nvSpPr>
+        <p:spPr/>
+        <p:txBody>
+          <a:bodyPr/>
+          <a:lstStyle/>
+          <a:p>
+            <a:r>
+              <a:rPr lang="en-GB" dirty="0" smtClean="0"/>
+              <a:t>Conclusions: Deployment Issues</a:t>
+            </a:r>
+            <a:endParaRPr lang="en-GB" dirty="0"/>
+          </a:p>
+        </p:txBody>
+      </p:sp>
+      <p:sp>
+        <p:nvSpPr>
+          <p:cNvPr id="3" name="Content Placeholder 2"/>
+          <p:cNvSpPr>
+            <a:spLocks noGrp="1"/>
+          </p:cNvSpPr>
+          <p:nvPr>
+            <p:ph idx="1"/>
+          </p:nvPr>
+        </p:nvSpPr>
+        <p:spPr/>
+        <p:txBody>
+          <a:bodyPr/>
+          <a:lstStyle/>
+          <a:p>
+            <a:r>
+              <a:rPr lang="en-GB" dirty="0" smtClean="0"/>
+              <a:t>Previously mentioned malware scanners implemented, but not all deployed into framework.</a:t>
+            </a:r>
+          </a:p>
+          <a:p>
+            <a:r>
+              <a:rPr lang="en-GB" dirty="0" smtClean="0"/>
+              <a:t>High Interaction scanning deployed but exclusion lists not yet stable</a:t>
+            </a:r>
+          </a:p>
+          <a:p>
+            <a:r>
+              <a:rPr lang="en-GB" dirty="0" smtClean="0"/>
+              <a:t>Not enough execution time to test hypothesis of trending topics correlating with malware.</a:t>
+            </a:r>
+            <a:endParaRPr lang="en-GB" dirty="0" smtClean="0"/>
+          </a:p>
+        </p:txBody>
+      </p:sp>
+    </p:spTree>
+  </p:cSld>
+  <p:clrMapOvr>
+    <a:masterClrMapping/>
+  </p:clrMapOvr>
+  <p:timing>
+    <p:tnLst>
+      <p:par>
+        <p:cTn id="1" dur="indefinite" restart="never" nodeType="tmRoot"/>
+      </p:par>
+    </p:tnLst>
+  </p:timing>
+</p:sld>
+</file>
+
+<file path=ppt/slides/slide13.xml><?xml version="1.0" encoding="utf-8"?>
+<p:sld xmlns:a="http://schemas.openxmlformats.org/drawingml/2006/main" xmlns:r="http://schemas.openxmlformats.org/officeDocument/2006/relationships" xmlns:p="http://schemas.openxmlformats.org/presentationml/2006/main">
+  <p:cSld>
+    <p:bg>
+      <p:bgPr>
+        <a:blipFill dpi="0" rotWithShape="1">
+          <a:blip r:embed="rId2" cstate="print">
+            <a:duotone>
+              <a:prstClr val="black"/>
+              <a:schemeClr val="accent6">
+                <a:tint val="45000"/>
+                <a:satMod val="400000"/>
+              </a:schemeClr>
+            </a:duotone>
+          </a:blip>
+          <a:srcRect/>
+          <a:stretch>
+            <a:fillRect l="-7000" r="-7000"/>
+          </a:stretch>
+        </a:blipFill>
+        <a:effectLst/>
+      </p:bgPr>
+    </p:bg>
+    <p:spTree>
+      <p:nvGrpSpPr>
+        <p:cNvPr id="1" name=""/>
+        <p:cNvGrpSpPr/>
+        <p:nvPr/>
+      </p:nvGrpSpPr>
+      <p:grpSpPr>
+        <a:xfrm>
+          <a:off x="0" y="0"/>
+          <a:ext cx="0" cy="0"/>
+          <a:chOff x="0" y="0"/>
+          <a:chExt cx="0" cy="0"/>
+        </a:xfrm>
+      </p:grpSpPr>
+      <p:sp>
+        <p:nvSpPr>
+          <p:cNvPr id="2" name="Title 1"/>
+          <p:cNvSpPr>
+            <a:spLocks noGrp="1"/>
+          </p:cNvSpPr>
+          <p:nvPr>
+            <p:ph type="title"/>
+          </p:nvPr>
+        </p:nvSpPr>
+        <p:spPr/>
+        <p:txBody>
+          <a:bodyPr/>
+          <a:lstStyle/>
+          <a:p>
+            <a:r>
+              <a:rPr lang="en-GB" dirty="0" smtClean="0"/>
+              <a:t>Conclusions: Systems Testing</a:t>
+            </a:r>
+            <a:endParaRPr lang="en-GB" dirty="0"/>
+          </a:p>
+        </p:txBody>
+      </p:sp>
+      <p:sp>
+        <p:nvSpPr>
+          <p:cNvPr id="3" name="Content Placeholder 2"/>
+          <p:cNvSpPr>
+            <a:spLocks noGrp="1"/>
+          </p:cNvSpPr>
+          <p:nvPr>
+            <p:ph idx="1"/>
+          </p:nvPr>
+        </p:nvSpPr>
+        <p:spPr>
+          <a:xfrm>
+            <a:off x="457200" y="1340768"/>
+            <a:ext cx="8229600" cy="4525963"/>
+          </a:xfrm>
+        </p:spPr>
+        <p:txBody>
+          <a:bodyPr/>
+          <a:lstStyle/>
+          <a:p>
+            <a:r>
+              <a:rPr lang="en-GB" dirty="0" smtClean="0"/>
+              <a:t>To test the framework as a whole, a set of risky topics were created:</a:t>
+            </a:r>
+            <a:endParaRPr lang="en-GB" dirty="0" smtClean="0"/>
+          </a:p>
+        </p:txBody>
+      </p:sp>
+      <p:pic>
+        <p:nvPicPr>
+          <p:cNvPr id="4" name="Picture 3" descr="dodgy.PNG"/>
+          <p:cNvPicPr>
+            <a:picLocks noChangeAspect="1"/>
+          </p:cNvPicPr>
+          <p:nvPr/>
+        </p:nvPicPr>
+        <p:blipFill>
+          <a:blip r:embed="rId3" cstate="print"/>
+          <a:stretch>
+            <a:fillRect/>
+          </a:stretch>
+        </p:blipFill>
+        <p:spPr>
+          <a:xfrm>
+            <a:off x="1891214" y="2492896"/>
+            <a:ext cx="5201066" cy="4104456"/>
+          </a:xfrm>
+          <a:prstGeom prst="rect">
+            <a:avLst/>
+          </a:prstGeom>
+        </p:spPr>
+      </p:pic>
+    </p:spTree>
+  </p:cSld>
+  <p:clrMapOvr>
+    <a:masterClrMapping/>
+  </p:clrMapOvr>
+  <p:timing>
+    <p:tnLst>
+      <p:par>
+        <p:cTn id="1" dur="indefinite" restart="never" nodeType="tmRoot">
+          <p:childTnLst>
+            <p:seq concurrent="1" nextAc="seek">
+              <p:cTn id="2" dur="indefinite" nodeType="mainSeq">
+                <p:childTnLst>
+                  <p:par>
+                    <p:cTn id="3" fill="hold">
+                      <p:stCondLst>
+                        <p:cond delay="indefinite"/>
+                      </p:stCondLst>
+                      <p:childTnLst>
+                        <p:par>
+                          <p:cTn id="4" fill="hold">
+                            <p:stCondLst>
+                              <p:cond delay="0"/>
+                            </p:stCondLst>
+                            <p:childTnLst>
+                              <p:par>
+                                <p:cTn id="5" presetID="1" presetClass="entr" presetSubtype="0" fill="hold" nodeType="clickEffect">
+                                  <p:stCondLst>
+                                    <p:cond delay="0"/>
+                                  </p:stCondLst>
+                                  <p:childTnLst>
+                                    <p:set>
+                                      <p:cBhvr>
+                                        <p:cTn id="6" dur="1" fill="hold">
+                                          <p:stCondLst>
+                                            <p:cond delay="0"/>
+                                          </p:stCondLst>
+                                        </p:cTn>
+                                        <p:tgtEl>
+                                          <p:spTgt spid="4"/>
+                                        </p:tgtEl>
+                                        <p:attrNameLst>
+                                          <p:attrName>style.visibility</p:attrName>
+                                        </p:attrNameLst>
+                                      </p:cBhvr>
+                                      <p:to>
+                                        <p:strVal val="visible"/>
+                                      </p:to>
+                                    </p:set>
+                                  </p:childTnLst>
+                                </p:cTn>
+                              </p:par>
+                            </p:childTnLst>
+                          </p:cTn>
+                        </p:par>
+                      </p:childTnLst>
+                    </p:cTn>
+                  </p:par>
+                </p:childTnLst>
+              </p:cTn>
+              <p:prevCondLst>
+                <p:cond evt="onPrev" delay="0">
+                  <p:tgtEl>
+                    <p:sldTgt/>
+                  </p:tgtEl>
+                </p:cond>
+              </p:prevCondLst>
+              <p:nextCondLst>
+                <p:cond evt="onNext" delay="0">
+                  <p:tgtEl>
+                    <p:sldTgt/>
+                  </p:tgtEl>
+                </p:cond>
+              </p:nextCondLst>
+            </p:seq>
+          </p:childTnLst>
+        </p:cTn>
+      </p:par>
+    </p:tnLst>
+  </p:timing>
+</p:sld>
+</file>
+
+<file path=ppt/slides/slide14.xml><?xml version="1.0" encoding="utf-8"?>
+<p:sld xmlns:a="http://schemas.openxmlformats.org/drawingml/2006/main" xmlns:r="http://schemas.openxmlformats.org/officeDocument/2006/relationships" xmlns:p="http://schemas.openxmlformats.org/presentationml/2006/main">
+  <p:cSld>
+    <p:bg>
+      <p:bgPr>
+        <a:blipFill dpi="0" rotWithShape="1">
+          <a:blip r:embed="rId2" cstate="print">
+            <a:duotone>
+              <a:prstClr val="black"/>
+              <a:schemeClr val="accent6">
+                <a:tint val="45000"/>
+                <a:satMod val="400000"/>
+              </a:schemeClr>
+            </a:duotone>
+          </a:blip>
+          <a:srcRect/>
+          <a:stretch>
+            <a:fillRect l="-7000" r="-7000"/>
+          </a:stretch>
+        </a:blipFill>
+        <a:effectLst/>
+      </p:bgPr>
+    </p:bg>
+    <p:spTree>
+      <p:nvGrpSpPr>
+        <p:cNvPr id="1" name=""/>
+        <p:cNvGrpSpPr/>
+        <p:nvPr/>
+      </p:nvGrpSpPr>
+      <p:grpSpPr>
+        <a:xfrm>
+          <a:off x="0" y="0"/>
+          <a:ext cx="0" cy="0"/>
+          <a:chOff x="0" y="0"/>
+          <a:chExt cx="0" cy="0"/>
+        </a:xfrm>
+      </p:grpSpPr>
+      <p:sp>
+        <p:nvSpPr>
+          <p:cNvPr id="2" name="Title 1"/>
+          <p:cNvSpPr>
+            <a:spLocks noGrp="1"/>
+          </p:cNvSpPr>
+          <p:nvPr>
+            <p:ph type="title"/>
+          </p:nvPr>
+        </p:nvSpPr>
+        <p:spPr/>
+        <p:txBody>
+          <a:bodyPr/>
+          <a:lstStyle/>
+          <a:p>
+            <a:r>
+              <a:rPr lang="en-GB" dirty="0" smtClean="0"/>
+              <a:t>Conclusions</a:t>
+            </a:r>
+            <a:r>
+              <a:rPr lang="en-GB" dirty="0" smtClean="0"/>
+              <a:t>: Malware Found</a:t>
+            </a:r>
+            <a:endParaRPr lang="en-GB" dirty="0"/>
+          </a:p>
+        </p:txBody>
+      </p:sp>
+      <p:sp>
+        <p:nvSpPr>
+          <p:cNvPr id="3" name="Content Placeholder 2"/>
+          <p:cNvSpPr>
+            <a:spLocks noGrp="1"/>
+          </p:cNvSpPr>
+          <p:nvPr>
+            <p:ph idx="1"/>
+          </p:nvPr>
+        </p:nvSpPr>
+        <p:spPr/>
+        <p:txBody>
+          <a:bodyPr>
+            <a:normAutofit fontScale="62500" lnSpcReduction="20000"/>
+          </a:bodyPr>
+          <a:lstStyle/>
+          <a:p>
+            <a:pPr>
+              <a:buNone/>
+            </a:pPr>
+            <a:r>
+              <a:rPr lang="en-GB" sz="4500" dirty="0" smtClean="0"/>
+              <a:t>Using the risky topic list, a large amount of malware was discovered (</a:t>
+            </a:r>
+            <a:r>
+              <a:rPr lang="en-GB" sz="4500" dirty="0" err="1" smtClean="0"/>
+              <a:t>e.g</a:t>
+            </a:r>
+            <a:r>
+              <a:rPr lang="en-GB" sz="4500" dirty="0" smtClean="0"/>
+              <a:t>):</a:t>
+            </a:r>
+          </a:p>
+          <a:p>
+            <a:pPr fontAlgn="t">
+              <a:buNone/>
+            </a:pPr>
+            <a:r>
+              <a:rPr lang="en-GB" dirty="0" smtClean="0"/>
+              <a:t>{</a:t>
+            </a:r>
+            <a:r>
+              <a:rPr lang="en-GB" dirty="0" smtClean="0"/>
+              <a:t>'stream': ('FOUND', 'winnow.botnet.ff.trojans.3793.UNOFFICIAL')}</a:t>
+            </a:r>
+          </a:p>
+          <a:p>
+            <a:pPr fontAlgn="t">
+              <a:buNone/>
+            </a:pPr>
+            <a:r>
+              <a:rPr lang="en-GB" dirty="0" smtClean="0"/>
+              <a:t>	http</a:t>
+            </a:r>
+            <a:r>
+              <a:rPr lang="en-GB" dirty="0" smtClean="0"/>
+              <a:t>://torrentz.eu/fb520fd9034543027172918dc430a171324fceff</a:t>
+            </a:r>
+          </a:p>
+          <a:p>
+            <a:pPr fontAlgn="t">
+              <a:buNone/>
+            </a:pPr>
+            <a:r>
+              <a:rPr lang="en-GB" dirty="0" smtClean="0"/>
+              <a:t>{</a:t>
+            </a:r>
+            <a:r>
+              <a:rPr lang="en-GB" dirty="0" smtClean="0"/>
+              <a:t>'stream': ('FOUND', 'winnow.botnet.ff.trojans.3793.UNOFFICIAL')}</a:t>
+            </a:r>
+          </a:p>
+          <a:p>
+            <a:pPr fontAlgn="t">
+              <a:buNone/>
+            </a:pPr>
+            <a:r>
+              <a:rPr lang="en-GB" dirty="0" smtClean="0"/>
+              <a:t>	http</a:t>
+            </a:r>
+            <a:r>
+              <a:rPr lang="en-GB" dirty="0" smtClean="0"/>
+              <a:t>://torrentz.eu/fe0a2b3e3240cb2652f15bec706b160678472b79</a:t>
+            </a:r>
+          </a:p>
+          <a:p>
+            <a:pPr fontAlgn="t">
+              <a:buNone/>
+            </a:pPr>
+            <a:r>
+              <a:rPr lang="en-GB" dirty="0" smtClean="0"/>
+              <a:t>{</a:t>
+            </a:r>
+            <a:r>
+              <a:rPr lang="en-GB" dirty="0" smtClean="0"/>
+              <a:t>'stream': ('FOUND', 'winnow.botnet.ff.trojans.3793.UNOFFICIAL')}</a:t>
+            </a:r>
+          </a:p>
+          <a:p>
+            <a:pPr fontAlgn="t">
+              <a:buNone/>
+            </a:pPr>
+            <a:r>
+              <a:rPr lang="en-GB" dirty="0" smtClean="0"/>
+              <a:t>	http</a:t>
+            </a:r>
+            <a:r>
+              <a:rPr lang="en-GB" dirty="0" smtClean="0"/>
+              <a:t>://torrentz.eu/2f3a1f3ea8d643a741b52349294cb729a99f553a</a:t>
+            </a:r>
+          </a:p>
+          <a:p>
+            <a:pPr fontAlgn="t">
+              <a:buNone/>
+            </a:pPr>
+            <a:r>
+              <a:rPr lang="en-GB" dirty="0" smtClean="0"/>
+              <a:t>{</a:t>
+            </a:r>
+            <a:r>
+              <a:rPr lang="en-GB" dirty="0" smtClean="0"/>
+              <a:t>'stream': ('FOUND', 'winnow.malware.m0.malware.740032.UNOFFICIAL')}</a:t>
+            </a:r>
+          </a:p>
+          <a:p>
+            <a:pPr fontAlgn="t">
+              <a:buNone/>
+            </a:pPr>
+            <a:r>
+              <a:rPr lang="en-GB" dirty="0" smtClean="0"/>
+              <a:t>	http</a:t>
+            </a:r>
+            <a:r>
+              <a:rPr lang="en-GB" dirty="0" smtClean="0"/>
+              <a:t>://</a:t>
+            </a:r>
+            <a:r>
+              <a:rPr lang="en-GB" dirty="0" smtClean="0"/>
+              <a:t>www.egydown.com/35666-euro-truck-simulator-2-pc-fightclub.html</a:t>
+            </a:r>
+          </a:p>
+          <a:p>
+            <a:pPr fontAlgn="t">
+              <a:buNone/>
+            </a:pPr>
+            <a:r>
+              <a:rPr lang="en-GB" dirty="0" smtClean="0"/>
+              <a:t>{</a:t>
+            </a:r>
+            <a:r>
+              <a:rPr lang="en-GB" dirty="0" smtClean="0"/>
+              <a:t>'stream': ('FOUND', </a:t>
+            </a:r>
+            <a:r>
+              <a:rPr lang="en-GB" dirty="0" smtClean="0"/>
+              <a:t>'Win.Trojan.8060046-1')}</a:t>
+            </a:r>
+          </a:p>
+          <a:p>
+            <a:pPr fontAlgn="t">
+              <a:buNone/>
+            </a:pPr>
+            <a:r>
+              <a:rPr lang="en-GB" dirty="0" smtClean="0"/>
+              <a:t>	</a:t>
+            </a:r>
+            <a:r>
+              <a:rPr lang="en-GB" dirty="0" smtClean="0"/>
+              <a:t>https</a:t>
+            </a:r>
+            <a:r>
+              <a:rPr lang="en-GB" dirty="0" smtClean="0"/>
+              <a:t>://dl.dropbox.com/u/85684172/FreeYouTubeDownloaderInstallerFull.exe</a:t>
+            </a:r>
+          </a:p>
+        </p:txBody>
+      </p:sp>
+    </p:spTree>
+  </p:cSld>
+  <p:clrMapOvr>
+    <a:masterClrMapping/>
+  </p:clrMapOvr>
+  <p:timing>
+    <p:tnLst>
+      <p:par>
+        <p:cTn id="1" dur="indefinite" restart="never" nodeType="tmRoot"/>
+      </p:par>
+    </p:tnLst>
+  </p:timing>
+</p:sld>
+</file>
+
+<file path=ppt/slides/slide15.xml><?xml version="1.0" encoding="utf-8"?>
+<p:sld xmlns:a="http://schemas.openxmlformats.org/drawingml/2006/main" xmlns:r="http://schemas.openxmlformats.org/officeDocument/2006/relationships" xmlns:p="http://schemas.openxmlformats.org/presentationml/2006/main">
+  <p:cSld>
+    <p:bg>
+      <p:bgPr>
+        <a:blipFill dpi="0" rotWithShape="1">
+          <a:blip r:embed="rId2" cstate="print">
+            <a:duotone>
+              <a:prstClr val="black"/>
+              <a:schemeClr val="accent6">
+                <a:tint val="45000"/>
+                <a:satMod val="400000"/>
+              </a:schemeClr>
+            </a:duotone>
+          </a:blip>
+          <a:srcRect/>
+          <a:stretch>
+            <a:fillRect l="-7000" r="-7000"/>
+          </a:stretch>
+        </a:blipFill>
+        <a:effectLst/>
+      </p:bgPr>
+    </p:bg>
+    <p:spTree>
+      <p:nvGrpSpPr>
+        <p:cNvPr id="1" name=""/>
+        <p:cNvGrpSpPr/>
+        <p:nvPr/>
+      </p:nvGrpSpPr>
+      <p:grpSpPr>
+        <a:xfrm>
+          <a:off x="0" y="0"/>
+          <a:ext cx="0" cy="0"/>
+          <a:chOff x="0" y="0"/>
+          <a:chExt cx="0" cy="0"/>
+        </a:xfrm>
+      </p:grpSpPr>
+      <p:sp>
+        <p:nvSpPr>
+          <p:cNvPr id="2" name="Title 1"/>
+          <p:cNvSpPr>
+            <a:spLocks noGrp="1"/>
+          </p:cNvSpPr>
+          <p:nvPr>
+            <p:ph type="title"/>
+          </p:nvPr>
+        </p:nvSpPr>
+        <p:spPr/>
+        <p:txBody>
+          <a:bodyPr/>
+          <a:lstStyle/>
+          <a:p>
+            <a:r>
+              <a:rPr lang="en-GB" dirty="0" smtClean="0"/>
+              <a:t>Conclusions</a:t>
+            </a:r>
+            <a:r>
+              <a:rPr lang="en-GB" dirty="0" smtClean="0"/>
+              <a:t>: Testing Trends</a:t>
+            </a:r>
+            <a:endParaRPr lang="en-GB" dirty="0"/>
+          </a:p>
+        </p:txBody>
+      </p:sp>
+      <p:sp>
+        <p:nvSpPr>
+          <p:cNvPr id="3" name="Content Placeholder 2"/>
+          <p:cNvSpPr>
+            <a:spLocks noGrp="1"/>
+          </p:cNvSpPr>
+          <p:nvPr>
+            <p:ph idx="1"/>
+          </p:nvPr>
+        </p:nvSpPr>
+        <p:spPr/>
+        <p:txBody>
+          <a:bodyPr/>
+          <a:lstStyle/>
+          <a:p>
+            <a:r>
+              <a:rPr lang="en-GB" dirty="0" smtClean="0"/>
+              <a:t>Short term scanning of trending topics did not return any malicious sites</a:t>
+            </a:r>
+          </a:p>
+          <a:p>
+            <a:r>
+              <a:rPr lang="en-GB" dirty="0" smtClean="0"/>
+              <a:t>However occurrence of malware is much lower on average than on risky sites</a:t>
+            </a:r>
+          </a:p>
+          <a:p>
+            <a:endParaRPr lang="en-GB" dirty="0" smtClean="0"/>
+          </a:p>
+          <a:p>
+            <a:r>
+              <a:rPr lang="en-GB" dirty="0" smtClean="0"/>
+              <a:t>Framework is ready to begin testing of trending topic</a:t>
+            </a:r>
+          </a:p>
+          <a:p>
+            <a:endParaRPr lang="en-GB" dirty="0"/>
+          </a:p>
+        </p:txBody>
+      </p:sp>
+    </p:spTree>
+  </p:cSld>
+  <p:clrMapOvr>
+    <a:masterClrMapping/>
+  </p:clrMapOvr>
+  <p:timing>
+    <p:tnLst>
+      <p:par>
+        <p:cTn id="1" dur="indefinite" restart="never" nodeType="tmRoot"/>
+      </p:par>
+    </p:tnLst>
+  </p:timing>
+</p:sld>
+</file>
+
+<file path=ppt/slides/slide16.xml><?xml version="1.0" encoding="utf-8"?>
+<p:sld xmlns:a="http://schemas.openxmlformats.org/drawingml/2006/main" xmlns:r="http://schemas.openxmlformats.org/officeDocument/2006/relationships" xmlns:p="http://schemas.openxmlformats.org/presentationml/2006/main">
+  <p:cSld>
+    <p:bg>
+      <p:bgPr>
+        <a:blipFill dpi="0" rotWithShape="1">
           <a:blip r:embed="rId2" cstate="print">
             <a:duotone>
               <a:prstClr val="black"/>
@@ -4796,58 +5969,23 @@
             <p:ph type="title"/>
           </p:nvPr>
         </p:nvSpPr>
-        <p:spPr/>
-        <p:txBody>
-          <a:bodyPr/>
-          <a:lstStyle/>
-          <a:p>
-            <a:r>
-              <a:rPr lang="en-GB" dirty="0" smtClean="0"/>
-              <a:t>Demo</a:t>
-            </a:r>
-            <a:endParaRPr lang="en-GB" dirty="0"/>
-          </a:p>
-        </p:txBody>
-      </p:sp>
-      <p:sp>
-        <p:nvSpPr>
-          <p:cNvPr id="5" name="Rounded Rectangle 4"/>
-          <p:cNvSpPr/>
-          <p:nvPr/>
-        </p:nvSpPr>
         <p:spPr>
           <a:xfrm>
-            <a:off x="2987824" y="3789040"/>
-            <a:ext cx="3240360" cy="1872208"/>
+            <a:off x="467544" y="2852936"/>
+            <a:ext cx="8229600" cy="1143000"/>
           </a:xfrm>
-          <a:prstGeom prst="roundRect">
-            <a:avLst/>
-          </a:prstGeom>
         </p:spPr>
-        <p:style>
-          <a:lnRef idx="3">
-            <a:schemeClr val="lt1"/>
-          </a:lnRef>
-          <a:fillRef idx="1">
-            <a:schemeClr val="accent6"/>
-          </a:fillRef>
-          <a:effectRef idx="1">
-            <a:schemeClr val="accent6"/>
-          </a:effectRef>
-          <a:fontRef idx="minor">
-            <a:schemeClr val="lt1"/>
-          </a:fontRef>
-        </p:style>
-        <p:txBody>
-          <a:bodyPr rtlCol="0" anchor="ctr"/>
-          <a:lstStyle/>
-          <a:p>
-            <a:pPr algn="ctr"/>
-            <a:r>
-              <a:rPr lang="en-GB" sz="4000" dirty="0" smtClean="0"/>
-              <a:t>Launch Demo</a:t>
-            </a:r>
-            <a:endParaRPr lang="en-GB" sz="4000" dirty="0"/>
+        <p:txBody>
+          <a:bodyPr>
+            <a:noAutofit/>
+          </a:bodyPr>
+          <a:lstStyle/>
+          <a:p>
+            <a:r>
+              <a:rPr lang="en-GB" sz="7200" dirty="0" smtClean="0"/>
+              <a:t>Demo</a:t>
+            </a:r>
+            <a:endParaRPr lang="en-GB" sz="7200" dirty="0"/>
           </a:p>
         </p:txBody>
       </p:sp>
@@ -4866,7 +6004,207 @@
 </p:sld>
 </file>
 
-<file path=ppt/slides/slide12.xml><?xml version="1.0" encoding="utf-8"?>
+<file path=ppt/slides/slide17.xml><?xml version="1.0" encoding="utf-8"?>
+<p:sld xmlns:a="http://schemas.openxmlformats.org/drawingml/2006/main" xmlns:r="http://schemas.openxmlformats.org/officeDocument/2006/relationships" xmlns:p="http://schemas.openxmlformats.org/presentationml/2006/main">
+  <p:cSld>
+    <p:bg>
+      <p:bgPr>
+        <a:blipFill dpi="0" rotWithShape="1">
+          <a:blip r:embed="rId2" cstate="print">
+            <a:duotone>
+              <a:prstClr val="black"/>
+              <a:schemeClr val="accent5">
+                <a:tint val="45000"/>
+                <a:satMod val="400000"/>
+              </a:schemeClr>
+            </a:duotone>
+          </a:blip>
+          <a:srcRect/>
+          <a:stretch>
+            <a:fillRect l="-7000" r="-7000"/>
+          </a:stretch>
+        </a:blipFill>
+        <a:effectLst/>
+      </p:bgPr>
+    </p:bg>
+    <p:spTree>
+      <p:nvGrpSpPr>
+        <p:cNvPr id="1" name=""/>
+        <p:cNvGrpSpPr/>
+        <p:nvPr/>
+      </p:nvGrpSpPr>
+      <p:grpSpPr>
+        <a:xfrm>
+          <a:off x="0" y="0"/>
+          <a:ext cx="0" cy="0"/>
+          <a:chOff x="0" y="0"/>
+          <a:chExt cx="0" cy="0"/>
+        </a:xfrm>
+      </p:grpSpPr>
+      <p:sp>
+        <p:nvSpPr>
+          <p:cNvPr id="2" name="Title 1"/>
+          <p:cNvSpPr>
+            <a:spLocks noGrp="1"/>
+          </p:cNvSpPr>
+          <p:nvPr>
+            <p:ph type="title"/>
+          </p:nvPr>
+        </p:nvSpPr>
+        <p:spPr/>
+        <p:txBody>
+          <a:bodyPr>
+            <a:noAutofit/>
+          </a:bodyPr>
+          <a:lstStyle/>
+          <a:p>
+            <a:r>
+              <a:rPr lang="en-GB" dirty="0" smtClean="0"/>
+              <a:t>Malware Screenshot</a:t>
+            </a:r>
+            <a:endParaRPr lang="en-GB" dirty="0"/>
+          </a:p>
+        </p:txBody>
+      </p:sp>
+      <p:pic>
+        <p:nvPicPr>
+          <p:cNvPr id="4" name="Content Placeholder 3" descr="screenshot.png"/>
+          <p:cNvPicPr>
+            <a:picLocks noGrp="1" noChangeAspect="1"/>
+          </p:cNvPicPr>
+          <p:nvPr>
+            <p:ph idx="1"/>
+          </p:nvPr>
+        </p:nvPicPr>
+        <p:blipFill>
+          <a:blip r:embed="rId3" cstate="print"/>
+          <a:stretch>
+            <a:fillRect/>
+          </a:stretch>
+        </p:blipFill>
+        <p:spPr>
+          <a:xfrm>
+            <a:off x="467544" y="1412776"/>
+            <a:ext cx="8005173" cy="4853136"/>
+          </a:xfrm>
+        </p:spPr>
+      </p:pic>
+    </p:spTree>
+  </p:cSld>
+  <p:clrMapOvr>
+    <a:masterClrMapping/>
+  </p:clrMapOvr>
+  <p:timing>
+    <p:tnLst>
+      <p:par>
+        <p:cTn id="1" dur="indefinite" restart="never" nodeType="tmRoot"/>
+      </p:par>
+    </p:tnLst>
+  </p:timing>
+</p:sld>
+</file>
+
+<file path=ppt/slides/slide18.xml><?xml version="1.0" encoding="utf-8"?>
+<p:sld xmlns:a="http://schemas.openxmlformats.org/drawingml/2006/main" xmlns:r="http://schemas.openxmlformats.org/officeDocument/2006/relationships" xmlns:p="http://schemas.openxmlformats.org/presentationml/2006/main">
+  <p:cSld>
+    <p:bg>
+      <p:bgPr>
+        <a:blipFill dpi="0" rotWithShape="1">
+          <a:blip r:embed="rId2" cstate="print">
+            <a:duotone>
+              <a:prstClr val="black"/>
+              <a:schemeClr val="accent5">
+                <a:tint val="45000"/>
+                <a:satMod val="400000"/>
+              </a:schemeClr>
+            </a:duotone>
+          </a:blip>
+          <a:srcRect/>
+          <a:stretch>
+            <a:fillRect l="-7000" r="-7000"/>
+          </a:stretch>
+        </a:blipFill>
+        <a:effectLst/>
+      </p:bgPr>
+    </p:bg>
+    <p:spTree>
+      <p:nvGrpSpPr>
+        <p:cNvPr id="1" name=""/>
+        <p:cNvGrpSpPr/>
+        <p:nvPr/>
+      </p:nvGrpSpPr>
+      <p:grpSpPr>
+        <a:xfrm>
+          <a:off x="0" y="0"/>
+          <a:ext cx="0" cy="0"/>
+          <a:chOff x="0" y="0"/>
+          <a:chExt cx="0" cy="0"/>
+        </a:xfrm>
+      </p:grpSpPr>
+      <p:sp>
+        <p:nvSpPr>
+          <p:cNvPr id="2" name="Title 1"/>
+          <p:cNvSpPr>
+            <a:spLocks noGrp="1"/>
+          </p:cNvSpPr>
+          <p:nvPr>
+            <p:ph type="title"/>
+          </p:nvPr>
+        </p:nvSpPr>
+        <p:spPr/>
+        <p:txBody>
+          <a:bodyPr>
+            <a:noAutofit/>
+          </a:bodyPr>
+          <a:lstStyle/>
+          <a:p>
+            <a:r>
+              <a:rPr lang="en-GB" dirty="0" smtClean="0"/>
+              <a:t>Malware Screenshot</a:t>
+            </a:r>
+            <a:endParaRPr lang="en-GB" dirty="0"/>
+          </a:p>
+        </p:txBody>
+      </p:sp>
+      <p:pic>
+        <p:nvPicPr>
+          <p:cNvPr id="8" name="Content Placeholder 7" descr="4pane.png"/>
+          <p:cNvPicPr>
+            <a:picLocks noGrp="1" noChangeAspect="1"/>
+          </p:cNvPicPr>
+          <p:nvPr>
+            <p:ph idx="1"/>
+          </p:nvPr>
+        </p:nvPicPr>
+        <p:blipFill>
+          <a:blip r:embed="rId3" cstate="print"/>
+          <a:stretch>
+            <a:fillRect/>
+          </a:stretch>
+        </p:blipFill>
+        <p:spPr>
+          <a:xfrm>
+            <a:off x="219820" y="1267544"/>
+            <a:ext cx="8672660" cy="5257800"/>
+          </a:xfrm>
+        </p:spPr>
+      </p:pic>
+    </p:spTree>
+  </p:cSld>
+  <p:clrMapOvr>
+    <a:masterClrMapping/>
+  </p:clrMapOvr>
+  <p:timing>
+    <p:tnLst>
+      <p:par>
+        <p:cTn id="1" dur="indefinite" restart="never" nodeType="tmRoot"/>
+      </p:par>
+    </p:tnLst>
+  </p:timing>
+</p:sld>
+</file>
+
+<file path=ppt/slides/slide19.xml><?xml version="1.0" encoding="utf-8"?>
 <p:sld xmlns:a="http://schemas.openxmlformats.org/drawingml/2006/main" xmlns:r="http://schemas.openxmlformats.org/officeDocument/2006/relationships" xmlns:p="http://schemas.openxmlformats.org/presentationml/2006/main">
   <p:cSld>
     <p:bg>
@@ -5002,7 +6340,175 @@
 </p:sld>
 </file>
 
-<file path=ppt/slides/slide13.xml><?xml version="1.0" encoding="utf-8"?>
+<file path=ppt/slides/slide2.xml><?xml version="1.0" encoding="utf-8"?>
+<p:sld xmlns:a="http://schemas.openxmlformats.org/drawingml/2006/main" xmlns:r="http://schemas.openxmlformats.org/officeDocument/2006/relationships" xmlns:p="http://schemas.openxmlformats.org/presentationml/2006/main">
+  <p:cSld>
+    <p:bg>
+      <p:bgPr>
+        <a:blipFill dpi="0" rotWithShape="1">
+          <a:blip r:embed="rId2" cstate="print">
+            <a:duotone>
+              <a:prstClr val="black"/>
+              <a:schemeClr val="accent1">
+                <a:tint val="45000"/>
+                <a:satMod val="400000"/>
+              </a:schemeClr>
+            </a:duotone>
+          </a:blip>
+          <a:srcRect/>
+          <a:stretch>
+            <a:fillRect l="-7000" r="-7000"/>
+          </a:stretch>
+        </a:blipFill>
+        <a:effectLst/>
+      </p:bgPr>
+    </p:bg>
+    <p:spTree>
+      <p:nvGrpSpPr>
+        <p:cNvPr id="1" name=""/>
+        <p:cNvGrpSpPr/>
+        <p:nvPr/>
+      </p:nvGrpSpPr>
+      <p:grpSpPr>
+        <a:xfrm>
+          <a:off x="0" y="0"/>
+          <a:ext cx="0" cy="0"/>
+          <a:chOff x="0" y="0"/>
+          <a:chExt cx="0" cy="0"/>
+        </a:xfrm>
+      </p:grpSpPr>
+      <p:sp>
+        <p:nvSpPr>
+          <p:cNvPr id="2" name="Title 1"/>
+          <p:cNvSpPr>
+            <a:spLocks noGrp="1"/>
+          </p:cNvSpPr>
+          <p:nvPr>
+            <p:ph type="title"/>
+          </p:nvPr>
+        </p:nvSpPr>
+        <p:spPr/>
+        <p:txBody>
+          <a:bodyPr/>
+          <a:lstStyle/>
+          <a:p>
+            <a:r>
+              <a:rPr lang="en-GB" dirty="0" smtClean="0"/>
+              <a:t>Contents</a:t>
+            </a:r>
+            <a:endParaRPr lang="en-GB" dirty="0"/>
+          </a:p>
+        </p:txBody>
+      </p:sp>
+      <p:sp>
+        <p:nvSpPr>
+          <p:cNvPr id="3" name="Content Placeholder 2"/>
+          <p:cNvSpPr>
+            <a:spLocks noGrp="1"/>
+          </p:cNvSpPr>
+          <p:nvPr>
+            <p:ph idx="1"/>
+          </p:nvPr>
+        </p:nvSpPr>
+        <p:spPr/>
+        <p:txBody>
+          <a:bodyPr>
+            <a:normAutofit fontScale="85000" lnSpcReduction="20000"/>
+          </a:bodyPr>
+          <a:lstStyle/>
+          <a:p>
+            <a:r>
+              <a:rPr lang="en-GB" dirty="0" smtClean="0"/>
+              <a:t>Introduction  &amp; Architecture Recap</a:t>
+            </a:r>
+          </a:p>
+          <a:p>
+            <a:r>
+              <a:rPr lang="en-GB" dirty="0" smtClean="0"/>
+              <a:t>Completed Work</a:t>
+            </a:r>
+          </a:p>
+          <a:p>
+            <a:pPr lvl="1"/>
+            <a:r>
+              <a:rPr lang="en-GB" dirty="0" smtClean="0"/>
+              <a:t>Framework</a:t>
+            </a:r>
+          </a:p>
+          <a:p>
+            <a:pPr lvl="1"/>
+            <a:r>
+              <a:rPr lang="en-GB" dirty="0" smtClean="0"/>
+              <a:t>Malware </a:t>
+            </a:r>
+            <a:r>
+              <a:rPr lang="en-GB" dirty="0" smtClean="0"/>
+              <a:t>Analysis</a:t>
+            </a:r>
+          </a:p>
+          <a:p>
+            <a:r>
+              <a:rPr lang="en-GB" dirty="0" smtClean="0"/>
+              <a:t>Demo</a:t>
+            </a:r>
+          </a:p>
+          <a:p>
+            <a:r>
+              <a:rPr lang="en-GB" dirty="0" smtClean="0"/>
+              <a:t>Planning</a:t>
+            </a:r>
+            <a:endParaRPr lang="en-GB" dirty="0" smtClean="0"/>
+          </a:p>
+          <a:p>
+            <a:r>
+              <a:rPr lang="en-GB" dirty="0" smtClean="0"/>
+              <a:t>Results</a:t>
+            </a:r>
+          </a:p>
+          <a:p>
+            <a:r>
+              <a:rPr lang="en-GB" dirty="0" smtClean="0"/>
+              <a:t>Challenges</a:t>
+            </a:r>
+          </a:p>
+          <a:p>
+            <a:r>
+              <a:rPr lang="en-GB" dirty="0" smtClean="0"/>
+              <a:t>Comparison with similar systems</a:t>
+            </a:r>
+            <a:endParaRPr lang="en-GB" dirty="0" smtClean="0"/>
+          </a:p>
+          <a:p>
+            <a:r>
+              <a:rPr lang="en-GB" dirty="0" smtClean="0"/>
+              <a:t>Future Work</a:t>
+            </a:r>
+          </a:p>
+          <a:p>
+            <a:r>
+              <a:rPr lang="en-GB" dirty="0" smtClean="0"/>
+              <a:t>Questions</a:t>
+            </a:r>
+            <a:endParaRPr lang="en-GB" dirty="0" smtClean="0"/>
+          </a:p>
+        </p:txBody>
+      </p:sp>
+    </p:spTree>
+  </p:cSld>
+  <p:clrMapOvr>
+    <a:masterClrMapping/>
+  </p:clrMapOvr>
+  <p:timing>
+    <p:tnLst>
+      <p:par>
+        <p:cTn id="1" dur="indefinite" restart="never" nodeType="tmRoot"/>
+      </p:par>
+    </p:tnLst>
+  </p:timing>
+</p:sld>
+</file>
+
+<file path=ppt/slides/slide20.xml><?xml version="1.0" encoding="utf-8"?>
 <p:sld xmlns:a="http://schemas.openxmlformats.org/drawingml/2006/main" xmlns:r="http://schemas.openxmlformats.org/officeDocument/2006/relationships" xmlns:p="http://schemas.openxmlformats.org/presentationml/2006/main">
   <p:cSld>
     <p:bg>
@@ -5056,11 +6562,7 @@
           <a:p>
             <a:r>
               <a:rPr lang="en-GB" dirty="0" smtClean="0"/>
-              <a:t>Project </a:t>
-            </a:r>
-            <a:r>
-              <a:rPr lang="en-GB" dirty="0" smtClean="0"/>
-              <a:t>Plan: Predicted</a:t>
+              <a:t>Project Plan: Predicted</a:t>
             </a:r>
             <a:endParaRPr lang="en-GB" dirty="0"/>
           </a:p>
@@ -5125,7 +6627,7 @@
 </p:sld>
 </file>
 
-<file path=ppt/slides/slide14.xml><?xml version="1.0" encoding="utf-8"?>
+<file path=ppt/slides/slide21.xml><?xml version="1.0" encoding="utf-8"?>
 <p:sld xmlns:a="http://schemas.openxmlformats.org/drawingml/2006/main" xmlns:r="http://schemas.openxmlformats.org/officeDocument/2006/relationships" xmlns:p="http://schemas.openxmlformats.org/presentationml/2006/main">
   <p:cSld>
     <p:bg>
@@ -5179,11 +6681,7 @@
           <a:p>
             <a:r>
               <a:rPr lang="en-GB" dirty="0" smtClean="0"/>
-              <a:t>Project </a:t>
-            </a:r>
-            <a:r>
-              <a:rPr lang="en-GB" dirty="0" smtClean="0"/>
-              <a:t>Plan: Final</a:t>
+              <a:t>Project Plan: Final</a:t>
             </a:r>
             <a:endParaRPr lang="en-GB" dirty="0"/>
           </a:p>
@@ -5248,7 +6746,7 @@
 </p:sld>
 </file>
 
-<file path=ppt/slides/slide15.xml><?xml version="1.0" encoding="utf-8"?>
+<file path=ppt/slides/slide22.xml><?xml version="1.0" encoding="utf-8"?>
 <p:sld xmlns:a="http://schemas.openxmlformats.org/drawingml/2006/main" xmlns:r="http://schemas.openxmlformats.org/officeDocument/2006/relationships" xmlns:p="http://schemas.openxmlformats.org/presentationml/2006/main">
   <p:cSld>
     <p:bg>
@@ -5358,7 +6856,7 @@
 </p:sld>
 </file>
 
-<file path=ppt/slides/slide16.xml><?xml version="1.0" encoding="utf-8"?>
+<file path=ppt/slides/slide23.xml><?xml version="1.0" encoding="utf-8"?>
 <p:sld xmlns:a="http://schemas.openxmlformats.org/drawingml/2006/main" xmlns:r="http://schemas.openxmlformats.org/officeDocument/2006/relationships" xmlns:p="http://schemas.openxmlformats.org/presentationml/2006/main">
   <p:cSld>
     <p:bg>
@@ -5457,545 +6955,7 @@
 </p:sld>
 </file>
 
-<file path=ppt/slides/slide17.xml><?xml version="1.0" encoding="utf-8"?>
-<p:sld xmlns:a="http://schemas.openxmlformats.org/drawingml/2006/main" xmlns:r="http://schemas.openxmlformats.org/officeDocument/2006/relationships" xmlns:p="http://schemas.openxmlformats.org/presentationml/2006/main">
-  <p:cSld>
-    <p:bg>
-      <p:bgPr>
-        <a:blipFill dpi="0" rotWithShape="1">
-          <a:blip r:embed="rId2" cstate="print">
-            <a:duotone>
-              <a:prstClr val="black"/>
-              <a:schemeClr val="accent6">
-                <a:tint val="45000"/>
-                <a:satMod val="400000"/>
-              </a:schemeClr>
-            </a:duotone>
-          </a:blip>
-          <a:srcRect/>
-          <a:stretch>
-            <a:fillRect l="-7000" r="-7000"/>
-          </a:stretch>
-        </a:blipFill>
-        <a:effectLst/>
-      </p:bgPr>
-    </p:bg>
-    <p:spTree>
-      <p:nvGrpSpPr>
-        <p:cNvPr id="1" name=""/>
-        <p:cNvGrpSpPr/>
-        <p:nvPr/>
-      </p:nvGrpSpPr>
-      <p:grpSpPr>
-        <a:xfrm>
-          <a:off x="0" y="0"/>
-          <a:ext cx="0" cy="0"/>
-          <a:chOff x="0" y="0"/>
-          <a:chExt cx="0" cy="0"/>
-        </a:xfrm>
-      </p:grpSpPr>
-      <p:sp>
-        <p:nvSpPr>
-          <p:cNvPr id="2" name="Title 1"/>
-          <p:cNvSpPr>
-            <a:spLocks noGrp="1"/>
-          </p:cNvSpPr>
-          <p:nvPr>
-            <p:ph type="title"/>
-          </p:nvPr>
-        </p:nvSpPr>
-        <p:spPr/>
-        <p:txBody>
-          <a:bodyPr/>
-          <a:lstStyle/>
-          <a:p>
-            <a:r>
-              <a:rPr lang="en-GB" dirty="0" smtClean="0"/>
-              <a:t>Results</a:t>
-            </a:r>
-            <a:endParaRPr lang="en-GB" dirty="0"/>
-          </a:p>
-        </p:txBody>
-      </p:sp>
-      <p:sp>
-        <p:nvSpPr>
-          <p:cNvPr id="3" name="Content Placeholder 2"/>
-          <p:cNvSpPr>
-            <a:spLocks noGrp="1"/>
-          </p:cNvSpPr>
-          <p:nvPr>
-            <p:ph idx="1"/>
-          </p:nvPr>
-        </p:nvSpPr>
-        <p:spPr/>
-        <p:txBody>
-          <a:bodyPr/>
-          <a:lstStyle/>
-          <a:p>
-            <a:r>
-              <a:rPr lang="en-GB" dirty="0" smtClean="0"/>
-              <a:t>Results derived from scanning conducted over the Christmas break</a:t>
-            </a:r>
-          </a:p>
-          <a:p>
-            <a:r>
-              <a:rPr lang="en-GB" dirty="0" smtClean="0"/>
-              <a:t>Not enough running time to make conclusions about the relation between trending topics and malware</a:t>
-            </a:r>
-          </a:p>
-          <a:p>
-            <a:r>
-              <a:rPr lang="en-GB" dirty="0" smtClean="0"/>
-              <a:t>However more malware was found from the trend source than a control trend of dictionary words.</a:t>
-            </a:r>
-          </a:p>
-        </p:txBody>
-      </p:sp>
-    </p:spTree>
-  </p:cSld>
-  <p:clrMapOvr>
-    <a:masterClrMapping/>
-  </p:clrMapOvr>
-  <p:timing>
-    <p:tnLst>
-      <p:par>
-        <p:cTn id="1" dur="indefinite" restart="never" nodeType="tmRoot"/>
-      </p:par>
-    </p:tnLst>
-  </p:timing>
-</p:sld>
-</file>
-
-<file path=ppt/slides/slide18.xml><?xml version="1.0" encoding="utf-8"?>
-<p:sld xmlns:a="http://schemas.openxmlformats.org/drawingml/2006/main" xmlns:r="http://schemas.openxmlformats.org/officeDocument/2006/relationships" xmlns:p="http://schemas.openxmlformats.org/presentationml/2006/main">
-  <p:cSld>
-    <p:bg>
-      <p:bgPr>
-        <a:blipFill dpi="0" rotWithShape="1">
-          <a:blip r:embed="rId2" cstate="print">
-            <a:duotone>
-              <a:prstClr val="black"/>
-              <a:schemeClr val="accent6">
-                <a:tint val="45000"/>
-                <a:satMod val="400000"/>
-              </a:schemeClr>
-            </a:duotone>
-          </a:blip>
-          <a:srcRect/>
-          <a:stretch>
-            <a:fillRect l="-7000" r="-7000"/>
-          </a:stretch>
-        </a:blipFill>
-        <a:effectLst/>
-      </p:bgPr>
-    </p:bg>
-    <p:spTree>
-      <p:nvGrpSpPr>
-        <p:cNvPr id="1" name=""/>
-        <p:cNvGrpSpPr/>
-        <p:nvPr/>
-      </p:nvGrpSpPr>
-      <p:grpSpPr>
-        <a:xfrm>
-          <a:off x="0" y="0"/>
-          <a:ext cx="0" cy="0"/>
-          <a:chOff x="0" y="0"/>
-          <a:chExt cx="0" cy="0"/>
-        </a:xfrm>
-      </p:grpSpPr>
-      <p:sp>
-        <p:nvSpPr>
-          <p:cNvPr id="2" name="Title 1"/>
-          <p:cNvSpPr>
-            <a:spLocks noGrp="1"/>
-          </p:cNvSpPr>
-          <p:nvPr>
-            <p:ph type="title"/>
-          </p:nvPr>
-        </p:nvSpPr>
-        <p:spPr/>
-        <p:txBody>
-          <a:bodyPr/>
-          <a:lstStyle/>
-          <a:p>
-            <a:r>
-              <a:rPr lang="en-GB" dirty="0" smtClean="0"/>
-              <a:t>Results</a:t>
-            </a:r>
-            <a:endParaRPr lang="en-GB" dirty="0"/>
-          </a:p>
-        </p:txBody>
-      </p:sp>
-      <p:sp>
-        <p:nvSpPr>
-          <p:cNvPr id="3" name="Content Placeholder 2"/>
-          <p:cNvSpPr>
-            <a:spLocks noGrp="1"/>
-          </p:cNvSpPr>
-          <p:nvPr>
-            <p:ph idx="1"/>
-          </p:nvPr>
-        </p:nvSpPr>
-        <p:spPr/>
-        <p:txBody>
-          <a:bodyPr/>
-          <a:lstStyle/>
-          <a:p>
-            <a:r>
-              <a:rPr lang="en-GB" dirty="0" smtClean="0"/>
-              <a:t>Malware Example?</a:t>
-            </a:r>
-          </a:p>
-        </p:txBody>
-      </p:sp>
-    </p:spTree>
-  </p:cSld>
-  <p:clrMapOvr>
-    <a:masterClrMapping/>
-  </p:clrMapOvr>
-  <p:timing>
-    <p:tnLst>
-      <p:par>
-        <p:cTn id="1" dur="indefinite" restart="never" nodeType="tmRoot"/>
-      </p:par>
-    </p:tnLst>
-  </p:timing>
-</p:sld>
-</file>
-
-<file path=ppt/slides/slide19.xml><?xml version="1.0" encoding="utf-8"?>
-<p:sld xmlns:a="http://schemas.openxmlformats.org/drawingml/2006/main" xmlns:r="http://schemas.openxmlformats.org/officeDocument/2006/relationships" xmlns:p="http://schemas.openxmlformats.org/presentationml/2006/main">
-  <p:cSld>
-    <p:bg>
-      <p:bgPr>
-        <a:blipFill dpi="0" rotWithShape="1">
-          <a:blip r:embed="rId2" cstate="print">
-            <a:duotone>
-              <a:prstClr val="black"/>
-              <a:schemeClr val="accent6">
-                <a:tint val="45000"/>
-                <a:satMod val="400000"/>
-              </a:schemeClr>
-            </a:duotone>
-          </a:blip>
-          <a:srcRect/>
-          <a:stretch>
-            <a:fillRect l="-7000" r="-7000"/>
-          </a:stretch>
-        </a:blipFill>
-        <a:effectLst/>
-      </p:bgPr>
-    </p:bg>
-    <p:spTree>
-      <p:nvGrpSpPr>
-        <p:cNvPr id="1" name=""/>
-        <p:cNvGrpSpPr/>
-        <p:nvPr/>
-      </p:nvGrpSpPr>
-      <p:grpSpPr>
-        <a:xfrm>
-          <a:off x="0" y="0"/>
-          <a:ext cx="0" cy="0"/>
-          <a:chOff x="0" y="0"/>
-          <a:chExt cx="0" cy="0"/>
-        </a:xfrm>
-      </p:grpSpPr>
-      <p:sp>
-        <p:nvSpPr>
-          <p:cNvPr id="2" name="Title 1"/>
-          <p:cNvSpPr>
-            <a:spLocks noGrp="1"/>
-          </p:cNvSpPr>
-          <p:nvPr>
-            <p:ph type="title"/>
-          </p:nvPr>
-        </p:nvSpPr>
-        <p:spPr/>
-        <p:txBody>
-          <a:bodyPr/>
-          <a:lstStyle/>
-          <a:p>
-            <a:r>
-              <a:rPr lang="en-GB" dirty="0" smtClean="0"/>
-              <a:t>Deployment Issues</a:t>
-            </a:r>
-            <a:endParaRPr lang="en-GB" dirty="0"/>
-          </a:p>
-        </p:txBody>
-      </p:sp>
-      <p:sp>
-        <p:nvSpPr>
-          <p:cNvPr id="3" name="Content Placeholder 2"/>
-          <p:cNvSpPr>
-            <a:spLocks noGrp="1"/>
-          </p:cNvSpPr>
-          <p:nvPr>
-            <p:ph idx="1"/>
-          </p:nvPr>
-        </p:nvSpPr>
-        <p:spPr/>
-        <p:txBody>
-          <a:bodyPr/>
-          <a:lstStyle/>
-          <a:p>
-            <a:endParaRPr lang="en-GB"/>
-          </a:p>
-        </p:txBody>
-      </p:sp>
-    </p:spTree>
-  </p:cSld>
-  <p:clrMapOvr>
-    <a:masterClrMapping/>
-  </p:clrMapOvr>
-  <p:timing>
-    <p:tnLst>
-      <p:par>
-        <p:cTn id="1" dur="indefinite" restart="never" nodeType="tmRoot"/>
-      </p:par>
-    </p:tnLst>
-  </p:timing>
-</p:sld>
-</file>
-
-<file path=ppt/slides/slide2.xml><?xml version="1.0" encoding="utf-8"?>
-<p:sld xmlns:a="http://schemas.openxmlformats.org/drawingml/2006/main" xmlns:r="http://schemas.openxmlformats.org/officeDocument/2006/relationships" xmlns:p="http://schemas.openxmlformats.org/presentationml/2006/main">
-  <p:cSld>
-    <p:bg>
-      <p:bgPr>
-        <a:blipFill dpi="0" rotWithShape="1">
-          <a:blip r:embed="rId2" cstate="print">
-            <a:duotone>
-              <a:prstClr val="black"/>
-              <a:schemeClr val="accent1">
-                <a:tint val="45000"/>
-                <a:satMod val="400000"/>
-              </a:schemeClr>
-            </a:duotone>
-          </a:blip>
-          <a:srcRect/>
-          <a:stretch>
-            <a:fillRect l="-7000" r="-7000"/>
-          </a:stretch>
-        </a:blipFill>
-        <a:effectLst/>
-      </p:bgPr>
-    </p:bg>
-    <p:spTree>
-      <p:nvGrpSpPr>
-        <p:cNvPr id="1" name=""/>
-        <p:cNvGrpSpPr/>
-        <p:nvPr/>
-      </p:nvGrpSpPr>
-      <p:grpSpPr>
-        <a:xfrm>
-          <a:off x="0" y="0"/>
-          <a:ext cx="0" cy="0"/>
-          <a:chOff x="0" y="0"/>
-          <a:chExt cx="0" cy="0"/>
-        </a:xfrm>
-      </p:grpSpPr>
-      <p:sp>
-        <p:nvSpPr>
-          <p:cNvPr id="2" name="Title 1"/>
-          <p:cNvSpPr>
-            <a:spLocks noGrp="1"/>
-          </p:cNvSpPr>
-          <p:nvPr>
-            <p:ph type="title"/>
-          </p:nvPr>
-        </p:nvSpPr>
-        <p:spPr/>
-        <p:txBody>
-          <a:bodyPr/>
-          <a:lstStyle/>
-          <a:p>
-            <a:r>
-              <a:rPr lang="en-GB" dirty="0" smtClean="0"/>
-              <a:t>Contents</a:t>
-            </a:r>
-            <a:endParaRPr lang="en-GB" dirty="0"/>
-          </a:p>
-        </p:txBody>
-      </p:sp>
-      <p:sp>
-        <p:nvSpPr>
-          <p:cNvPr id="3" name="Content Placeholder 2"/>
-          <p:cNvSpPr>
-            <a:spLocks noGrp="1"/>
-          </p:cNvSpPr>
-          <p:nvPr>
-            <p:ph idx="1"/>
-          </p:nvPr>
-        </p:nvSpPr>
-        <p:spPr/>
-        <p:txBody>
-          <a:bodyPr>
-            <a:normAutofit/>
-          </a:bodyPr>
-          <a:lstStyle/>
-          <a:p>
-            <a:r>
-              <a:rPr lang="en-GB" dirty="0" smtClean="0"/>
-              <a:t>Introduction  &amp; Architecture Recap</a:t>
-            </a:r>
-          </a:p>
-          <a:p>
-            <a:r>
-              <a:rPr lang="en-GB" dirty="0" smtClean="0"/>
-              <a:t>Completed Work</a:t>
-            </a:r>
-          </a:p>
-          <a:p>
-            <a:pPr lvl="1"/>
-            <a:r>
-              <a:rPr lang="en-GB" dirty="0" smtClean="0"/>
-              <a:t>Framework</a:t>
-            </a:r>
-          </a:p>
-          <a:p>
-            <a:pPr lvl="1"/>
-            <a:r>
-              <a:rPr lang="en-GB" dirty="0" smtClean="0"/>
-              <a:t>Malware Analysis</a:t>
-            </a:r>
-          </a:p>
-          <a:p>
-            <a:pPr lvl="1"/>
-            <a:r>
-              <a:rPr lang="en-GB" dirty="0" smtClean="0"/>
-              <a:t>Report</a:t>
-            </a:r>
-          </a:p>
-          <a:p>
-            <a:r>
-              <a:rPr lang="en-GB" dirty="0" smtClean="0"/>
-              <a:t>Results</a:t>
-            </a:r>
-          </a:p>
-          <a:p>
-            <a:r>
-              <a:rPr lang="en-GB" dirty="0" smtClean="0"/>
-              <a:t>Future Work</a:t>
-            </a:r>
-          </a:p>
-          <a:p>
-            <a:r>
-              <a:rPr lang="en-GB" dirty="0" smtClean="0"/>
-              <a:t>Questions</a:t>
-            </a:r>
-          </a:p>
-        </p:txBody>
-      </p:sp>
-    </p:spTree>
-  </p:cSld>
-  <p:clrMapOvr>
-    <a:masterClrMapping/>
-  </p:clrMapOvr>
-  <p:timing>
-    <p:tnLst>
-      <p:par>
-        <p:cTn id="1" dur="indefinite" restart="never" nodeType="tmRoot"/>
-      </p:par>
-    </p:tnLst>
-  </p:timing>
-</p:sld>
-</file>
-
-<file path=ppt/slides/slide20.xml><?xml version="1.0" encoding="utf-8"?>
-<p:sld xmlns:a="http://schemas.openxmlformats.org/drawingml/2006/main" xmlns:r="http://schemas.openxmlformats.org/officeDocument/2006/relationships" xmlns:p="http://schemas.openxmlformats.org/presentationml/2006/main">
-  <p:cSld>
-    <p:bg>
-      <p:bgPr>
-        <a:blipFill dpi="0" rotWithShape="1">
-          <a:blip r:embed="rId2" cstate="print">
-            <a:duotone>
-              <a:prstClr val="black"/>
-              <a:schemeClr val="accent6">
-                <a:tint val="45000"/>
-                <a:satMod val="400000"/>
-              </a:schemeClr>
-            </a:duotone>
-          </a:blip>
-          <a:srcRect/>
-          <a:stretch>
-            <a:fillRect l="-7000" r="-7000"/>
-          </a:stretch>
-        </a:blipFill>
-        <a:effectLst/>
-      </p:bgPr>
-    </p:bg>
-    <p:spTree>
-      <p:nvGrpSpPr>
-        <p:cNvPr id="1" name=""/>
-        <p:cNvGrpSpPr/>
-        <p:nvPr/>
-      </p:nvGrpSpPr>
-      <p:grpSpPr>
-        <a:xfrm>
-          <a:off x="0" y="0"/>
-          <a:ext cx="0" cy="0"/>
-          <a:chOff x="0" y="0"/>
-          <a:chExt cx="0" cy="0"/>
-        </a:xfrm>
-      </p:grpSpPr>
-      <p:sp>
-        <p:nvSpPr>
-          <p:cNvPr id="2" name="Title 1"/>
-          <p:cNvSpPr>
-            <a:spLocks noGrp="1"/>
-          </p:cNvSpPr>
-          <p:nvPr>
-            <p:ph type="title"/>
-          </p:nvPr>
-        </p:nvSpPr>
-        <p:spPr/>
-        <p:txBody>
-          <a:bodyPr/>
-          <a:lstStyle/>
-          <a:p>
-            <a:r>
-              <a:rPr lang="en-GB" dirty="0" smtClean="0"/>
-              <a:t>Production Readiness</a:t>
-            </a:r>
-            <a:endParaRPr lang="en-GB" dirty="0"/>
-          </a:p>
-        </p:txBody>
-      </p:sp>
-      <p:sp>
-        <p:nvSpPr>
-          <p:cNvPr id="3" name="Content Placeholder 2"/>
-          <p:cNvSpPr>
-            <a:spLocks noGrp="1"/>
-          </p:cNvSpPr>
-          <p:nvPr>
-            <p:ph idx="1"/>
-          </p:nvPr>
-        </p:nvSpPr>
-        <p:spPr/>
-        <p:txBody>
-          <a:bodyPr/>
-          <a:lstStyle/>
-          <a:p>
-            <a:endParaRPr lang="en-GB" dirty="0"/>
-          </a:p>
-        </p:txBody>
-      </p:sp>
-    </p:spTree>
-  </p:cSld>
-  <p:clrMapOvr>
-    <a:masterClrMapping/>
-  </p:clrMapOvr>
-  <p:timing>
-    <p:tnLst>
-      <p:par>
-        <p:cTn id="1" dur="indefinite" restart="never" nodeType="tmRoot"/>
-      </p:par>
-    </p:tnLst>
-  </p:timing>
-</p:sld>
-</file>
-
-<file path=ppt/slides/slide21.xml><?xml version="1.0" encoding="utf-8"?>
+<file path=ppt/slides/slide24.xml><?xml version="1.0" encoding="utf-8"?>
 <p:sld xmlns:a="http://schemas.openxmlformats.org/drawingml/2006/main" xmlns:r="http://schemas.openxmlformats.org/officeDocument/2006/relationships" xmlns:p="http://schemas.openxmlformats.org/presentationml/2006/main">
   <p:cSld>
     <p:bg>
@@ -6089,7 +7049,7 @@
 </p:sld>
 </file>
 
-<file path=ppt/slides/slide22.xml><?xml version="1.0" encoding="utf-8"?>
+<file path=ppt/slides/slide25.xml><?xml version="1.0" encoding="utf-8"?>
 <p:sld xmlns:a="http://schemas.openxmlformats.org/drawingml/2006/main" xmlns:r="http://schemas.openxmlformats.org/officeDocument/2006/relationships" xmlns:p="http://schemas.openxmlformats.org/presentationml/2006/main">
   <p:cSld>
     <p:bg>
@@ -6223,7 +7183,7 @@
 </p:sld>
 </file>
 
-<file path=ppt/slides/slide23.xml><?xml version="1.0" encoding="utf-8"?>
+<file path=ppt/slides/slide26.xml><?xml version="1.0" encoding="utf-8"?>
 <p:sld xmlns:a="http://schemas.openxmlformats.org/drawingml/2006/main" xmlns:r="http://schemas.openxmlformats.org/officeDocument/2006/relationships" xmlns:p="http://schemas.openxmlformats.org/presentationml/2006/main">
   <p:cSld>
     <p:bg>
@@ -7865,26 +8825,56 @@
               <a:rPr lang="en-US" dirty="0">
                 <a:latin typeface="+mn-lt"/>
               </a:rPr>
-              <a:t>cannot wait on each other</a:t>
-            </a:r>
-          </a:p>
-          <a:p>
-            <a:pPr lvl="0"/>
-            <a:r>
-              <a:rPr lang="en-US" dirty="0">
+              <a:t>cannot wait </a:t>
+            </a:r>
+            <a:r>
+              <a:rPr lang="en-US" dirty="0" smtClean="0">
                 <a:latin typeface="+mn-lt"/>
               </a:rPr>
-              <a:t>The thread pools would starve</a:t>
-            </a:r>
-          </a:p>
-          <a:p>
-            <a:pPr lvl="0"/>
-            <a:r>
-              <a:rPr lang="en-US" dirty="0">
+              <a:t>on component tasks</a:t>
+            </a:r>
+            <a:endParaRPr lang="en-US" dirty="0">
+              <a:latin typeface="+mn-lt"/>
+            </a:endParaRPr>
+          </a:p>
+          <a:p>
+            <a:pPr lvl="1"/>
+            <a:r>
+              <a:rPr lang="en-US" dirty="0" smtClean="0">
                 <a:latin typeface="+mn-lt"/>
               </a:rPr>
-              <a:t>So Tasks have optional callbacks</a:t>
-            </a:r>
+              <a:t>Prevent task pool exhaustion</a:t>
+            </a:r>
+            <a:endParaRPr lang="en-US" dirty="0">
+              <a:latin typeface="+mn-lt"/>
+            </a:endParaRPr>
+          </a:p>
+          <a:p>
+            <a:pPr lvl="0"/>
+            <a:r>
+              <a:rPr lang="en-US" dirty="0" smtClean="0">
+                <a:latin typeface="+mn-lt"/>
+              </a:rPr>
+              <a:t>Tasks use callbacks to describe test dependencies</a:t>
+            </a:r>
+          </a:p>
+          <a:p>
+            <a:pPr lvl="1"/>
+            <a:r>
+              <a:rPr lang="en-US" dirty="0" smtClean="0">
+                <a:latin typeface="+mn-lt"/>
+              </a:rPr>
+              <a:t>Callback from Task returned to parent Task when child Tasks are complete</a:t>
+            </a:r>
+            <a:endParaRPr lang="en-US" dirty="0" smtClean="0">
+              <a:latin typeface="+mn-lt"/>
+            </a:endParaRPr>
+          </a:p>
+          <a:p>
+            <a:pPr lvl="1"/>
+            <a:endParaRPr lang="en-US" dirty="0">
+              <a:latin typeface="+mn-lt"/>
+            </a:endParaRPr>
           </a:p>
         </p:txBody>
       </p:sp>
@@ -8365,7 +9355,7 @@
           <a:blip r:embed="rId3" cstate="print">
             <a:duotone>
               <a:prstClr val="black"/>
-              <a:schemeClr val="accent3">
+              <a:schemeClr val="accent2">
                 <a:tint val="45000"/>
                 <a:satMod val="400000"/>
               </a:schemeClr>
@@ -8395,326 +9385,67 @@
       </p:grpSpPr>
       <p:sp>
         <p:nvSpPr>
-          <p:cNvPr id="3074" name="Rectangle 1"/>
-          <p:cNvSpPr>
-            <a:spLocks noGrp="1" noChangeArrowheads="1"/>
+          <p:cNvPr id="2" name="Title 1"/>
+          <p:cNvSpPr>
+            <a:spLocks noGrp="1"/>
           </p:cNvSpPr>
           <p:nvPr>
             <p:ph type="title"/>
           </p:nvPr>
         </p:nvSpPr>
-        <p:spPr>
-          <a:xfrm>
-            <a:off x="456481" y="273629"/>
-            <a:ext cx="8228160" cy="1144921"/>
-          </a:xfrm>
-        </p:spPr>
+        <p:spPr/>
         <p:txBody>
           <a:bodyPr/>
           <a:lstStyle/>
           <a:p>
-            <a:pPr>
-              <a:tabLst>
-                <a:tab pos="656650" algn="l"/>
-                <a:tab pos="1313299" algn="l"/>
-                <a:tab pos="1969949" algn="l"/>
-                <a:tab pos="2626599" algn="l"/>
-                <a:tab pos="3283248" algn="l"/>
-                <a:tab pos="3939898" algn="l"/>
-                <a:tab pos="4596548" algn="l"/>
-                <a:tab pos="5253198" algn="l"/>
-                <a:tab pos="5909847" algn="l"/>
-                <a:tab pos="6566497" algn="l"/>
-                <a:tab pos="7223147" algn="l"/>
-                <a:tab pos="7879796" algn="l"/>
-              </a:tabLst>
-            </a:pPr>
-            <a:r>
-              <a:rPr lang="en-GB" dirty="0" smtClean="0"/>
-              <a:t>Malware Detection Subsystems</a:t>
-            </a:r>
-          </a:p>
-        </p:txBody>
-      </p:sp>
-      <p:sp>
-        <p:nvSpPr>
-          <p:cNvPr id="4098" name="Rectangle 2"/>
-          <p:cNvSpPr>
-            <a:spLocks noGrp="1" noChangeArrowheads="1"/>
-          </p:cNvSpPr>
-          <p:nvPr>
-            <p:ph type="body" idx="1"/>
-          </p:nvPr>
-        </p:nvSpPr>
-        <p:spPr>
-          <a:xfrm>
-            <a:off x="456480" y="1604328"/>
-            <a:ext cx="8033760" cy="4666090"/>
-          </a:xfrm>
-        </p:spPr>
-        <p:txBody>
-          <a:bodyPr/>
-          <a:lstStyle/>
-          <a:p>
-            <a:pPr marL="449287" indent="-260644">
-              <a:buSzPct val="45000"/>
-              <a:buFont typeface="Wingdings" charset="2"/>
-              <a:buChar char=""/>
-              <a:tabLst>
-                <a:tab pos="656650" algn="l"/>
-                <a:tab pos="1313299" algn="l"/>
-                <a:tab pos="1969949" algn="l"/>
-                <a:tab pos="2626599" algn="l"/>
-                <a:tab pos="3283248" algn="l"/>
-                <a:tab pos="3939898" algn="l"/>
-                <a:tab pos="4596548" algn="l"/>
-                <a:tab pos="5253198" algn="l"/>
-                <a:tab pos="5909847" algn="l"/>
-                <a:tab pos="6566497" algn="l"/>
-                <a:tab pos="7223147" algn="l"/>
-                <a:tab pos="7879796" algn="l"/>
-              </a:tabLst>
-            </a:pPr>
-            <a:r>
-              <a:rPr lang="en-GB" dirty="0" smtClean="0"/>
-              <a:t>6 subsystems in 3 interaction </a:t>
-            </a:r>
-            <a:r>
-              <a:rPr lang="en-GB" dirty="0" smtClean="0"/>
-              <a:t>levels</a:t>
-            </a:r>
-            <a:endParaRPr lang="en-GB" dirty="0" smtClean="0"/>
-          </a:p>
-          <a:p>
-            <a:pPr marL="449287" indent="-260644">
-              <a:buSzPct val="45000"/>
-              <a:buFont typeface="Wingdings" charset="2"/>
-              <a:buChar char=""/>
-              <a:tabLst>
-                <a:tab pos="656650" algn="l"/>
-                <a:tab pos="1313299" algn="l"/>
-                <a:tab pos="1969949" algn="l"/>
-                <a:tab pos="2626599" algn="l"/>
-                <a:tab pos="3283248" algn="l"/>
-                <a:tab pos="3939898" algn="l"/>
-                <a:tab pos="4596548" algn="l"/>
-                <a:tab pos="5253198" algn="l"/>
-                <a:tab pos="5909847" algn="l"/>
-                <a:tab pos="6566497" algn="l"/>
-                <a:tab pos="7223147" algn="l"/>
-                <a:tab pos="7879796" algn="l"/>
-              </a:tabLst>
-            </a:pPr>
-            <a:r>
-              <a:rPr lang="en-GB" dirty="0" smtClean="0"/>
-              <a:t>No </a:t>
-            </a:r>
-            <a:r>
-              <a:rPr lang="en-GB" dirty="0" smtClean="0"/>
-              <a:t>Interaction</a:t>
-            </a:r>
-          </a:p>
-          <a:p>
-            <a:pPr marL="812172" lvl="1" indent="-260644">
-              <a:buSzPct val="45000"/>
-              <a:buFont typeface="Wingdings" charset="2"/>
-              <a:buChar char=""/>
-              <a:tabLst>
-                <a:tab pos="656650" algn="l"/>
-                <a:tab pos="1313299" algn="l"/>
-                <a:tab pos="1969949" algn="l"/>
-                <a:tab pos="2626599" algn="l"/>
-                <a:tab pos="3283248" algn="l"/>
-                <a:tab pos="3939898" algn="l"/>
-                <a:tab pos="4596548" algn="l"/>
-                <a:tab pos="5253198" algn="l"/>
-                <a:tab pos="5909847" algn="l"/>
-                <a:tab pos="6566497" algn="l"/>
-                <a:tab pos="7223147" algn="l"/>
-                <a:tab pos="7879796" algn="l"/>
-              </a:tabLst>
-            </a:pPr>
-            <a:r>
-              <a:rPr lang="en-GB" dirty="0" smtClean="0"/>
-              <a:t>URL Classification</a:t>
-            </a:r>
-          </a:p>
-          <a:p>
-            <a:pPr marL="1175057" lvl="2" indent="-260644">
-              <a:buSzPct val="45000"/>
-              <a:buFont typeface="Wingdings" charset="2"/>
-              <a:buChar char=""/>
-              <a:tabLst>
-                <a:tab pos="656650" algn="l"/>
-                <a:tab pos="1313299" algn="l"/>
-                <a:tab pos="1969949" algn="l"/>
-                <a:tab pos="2626599" algn="l"/>
-                <a:tab pos="3283248" algn="l"/>
-                <a:tab pos="3939898" algn="l"/>
-                <a:tab pos="4596548" algn="l"/>
-                <a:tab pos="5253198" algn="l"/>
-                <a:tab pos="5909847" algn="l"/>
-                <a:tab pos="6566497" algn="l"/>
-                <a:tab pos="7223147" algn="l"/>
-                <a:tab pos="7879796" algn="l"/>
-              </a:tabLst>
-            </a:pPr>
-            <a:r>
-              <a:rPr lang="en-GB" dirty="0" smtClean="0"/>
-              <a:t>Calculate the probability of a page having malware</a:t>
-            </a:r>
-          </a:p>
-          <a:p>
-            <a:pPr marL="1175057" lvl="2" indent="-260644">
-              <a:buSzPct val="45000"/>
-              <a:buFont typeface="Wingdings" charset="2"/>
-              <a:buChar char=""/>
-              <a:tabLst>
-                <a:tab pos="656650" algn="l"/>
-                <a:tab pos="1313299" algn="l"/>
-                <a:tab pos="1969949" algn="l"/>
-                <a:tab pos="2626599" algn="l"/>
-                <a:tab pos="3283248" algn="l"/>
-                <a:tab pos="3939898" algn="l"/>
-                <a:tab pos="4596548" algn="l"/>
-                <a:tab pos="5253198" algn="l"/>
-                <a:tab pos="5909847" algn="l"/>
-                <a:tab pos="6566497" algn="l"/>
-                <a:tab pos="7223147" algn="l"/>
-                <a:tab pos="7879796" algn="l"/>
-              </a:tabLst>
-            </a:pPr>
-            <a:r>
-              <a:rPr lang="en-GB" dirty="0" smtClean="0"/>
-              <a:t>From history of other pages, stored in a database</a:t>
-            </a:r>
-          </a:p>
-          <a:p>
-            <a:pPr marL="1175057" lvl="2" indent="-260644">
-              <a:buSzPct val="45000"/>
-              <a:buFont typeface="Wingdings" charset="2"/>
-              <a:buChar char=""/>
-              <a:tabLst>
-                <a:tab pos="656650" algn="l"/>
-                <a:tab pos="1313299" algn="l"/>
-                <a:tab pos="1969949" algn="l"/>
-                <a:tab pos="2626599" algn="l"/>
-                <a:tab pos="3283248" algn="l"/>
-                <a:tab pos="3939898" algn="l"/>
-                <a:tab pos="4596548" algn="l"/>
-                <a:tab pos="5253198" algn="l"/>
-                <a:tab pos="5909847" algn="l"/>
-                <a:tab pos="6566497" algn="l"/>
-                <a:tab pos="7223147" algn="l"/>
-                <a:tab pos="7879796" algn="l"/>
-              </a:tabLst>
-            </a:pPr>
-            <a:r>
-              <a:rPr lang="en-GB" dirty="0" smtClean="0"/>
-              <a:t>And the other no interaction scanners</a:t>
-            </a:r>
-          </a:p>
-          <a:p>
-            <a:pPr marL="812172" lvl="1" indent="-260644">
-              <a:buSzPct val="45000"/>
-              <a:buFont typeface="Wingdings" charset="2"/>
-              <a:buChar char=""/>
-              <a:tabLst>
-                <a:tab pos="656650" algn="l"/>
-                <a:tab pos="1313299" algn="l"/>
-                <a:tab pos="1969949" algn="l"/>
-                <a:tab pos="2626599" algn="l"/>
-                <a:tab pos="3283248" algn="l"/>
-                <a:tab pos="3939898" algn="l"/>
-                <a:tab pos="4596548" algn="l"/>
-                <a:tab pos="5253198" algn="l"/>
-                <a:tab pos="5909847" algn="l"/>
-                <a:tab pos="6566497" algn="l"/>
-                <a:tab pos="7223147" algn="l"/>
-                <a:tab pos="7879796" algn="l"/>
-              </a:tabLst>
-            </a:pPr>
-            <a:r>
-              <a:rPr lang="en-GB" dirty="0" smtClean="0"/>
-              <a:t>Malware List Scanners</a:t>
-            </a:r>
-          </a:p>
-          <a:p>
-            <a:pPr marL="1175057" lvl="2" indent="-260644">
-              <a:buSzPct val="45000"/>
-              <a:buFont typeface="Wingdings" charset="2"/>
-              <a:buChar char=""/>
-              <a:tabLst>
-                <a:tab pos="656650" algn="l"/>
-                <a:tab pos="1313299" algn="l"/>
-                <a:tab pos="1969949" algn="l"/>
-                <a:tab pos="2626599" algn="l"/>
-                <a:tab pos="3283248" algn="l"/>
-                <a:tab pos="3939898" algn="l"/>
-                <a:tab pos="4596548" algn="l"/>
-                <a:tab pos="5253198" algn="l"/>
-                <a:tab pos="5909847" algn="l"/>
-                <a:tab pos="6566497" algn="l"/>
-                <a:tab pos="7223147" algn="l"/>
-                <a:tab pos="7879796" algn="l"/>
-              </a:tabLst>
-            </a:pPr>
-            <a:r>
-              <a:rPr lang="en-GB" dirty="0" smtClean="0"/>
-              <a:t>Uses </a:t>
-            </a:r>
-            <a:r>
-              <a:rPr lang="en-GB" dirty="0" err="1" smtClean="0"/>
-              <a:t>Alexa</a:t>
-            </a:r>
-            <a:r>
-              <a:rPr lang="en-GB" dirty="0" smtClean="0"/>
-              <a:t> and WOT (Web Of Trust)</a:t>
-            </a:r>
-          </a:p>
-          <a:p>
-            <a:pPr marL="1175057" lvl="2" indent="-260644">
-              <a:buSzPct val="45000"/>
-              <a:buFont typeface="Wingdings" charset="2"/>
-              <a:buChar char=""/>
-              <a:tabLst>
-                <a:tab pos="656650" algn="l"/>
-                <a:tab pos="1313299" algn="l"/>
-                <a:tab pos="1969949" algn="l"/>
-                <a:tab pos="2626599" algn="l"/>
-                <a:tab pos="3283248" algn="l"/>
-                <a:tab pos="3939898" algn="l"/>
-                <a:tab pos="4596548" algn="l"/>
-                <a:tab pos="5253198" algn="l"/>
-                <a:tab pos="5909847" algn="l"/>
-                <a:tab pos="6566497" algn="l"/>
-                <a:tab pos="7223147" algn="l"/>
-                <a:tab pos="7879796" algn="l"/>
-              </a:tabLst>
-            </a:pPr>
-            <a:endParaRPr lang="en-GB" dirty="0" smtClean="0"/>
-          </a:p>
-          <a:p>
-            <a:pPr marL="812172" lvl="1" indent="-260644">
-              <a:buSzPct val="75000"/>
-              <a:buFont typeface="Symbol" charset="2"/>
-              <a:buChar char=""/>
-              <a:tabLst>
-                <a:tab pos="656650" algn="l"/>
-                <a:tab pos="1313299" algn="l"/>
-                <a:tab pos="1969949" algn="l"/>
-                <a:tab pos="2626599" algn="l"/>
-                <a:tab pos="3283248" algn="l"/>
-                <a:tab pos="3939898" algn="l"/>
-                <a:tab pos="4596548" algn="l"/>
-                <a:tab pos="5253198" algn="l"/>
-                <a:tab pos="5909847" algn="l"/>
-                <a:tab pos="6566497" algn="l"/>
-                <a:tab pos="7223147" algn="l"/>
-                <a:tab pos="7879796" algn="l"/>
-              </a:tabLst>
-            </a:pPr>
-            <a:endParaRPr lang="en-GB" dirty="0" smtClean="0"/>
+            <a:r>
+              <a:rPr lang="en-GB" dirty="0" smtClean="0"/>
+              <a:t>Framework &amp; Classification</a:t>
+            </a:r>
+            <a:endParaRPr lang="en-GB" dirty="0"/>
+          </a:p>
+        </p:txBody>
+      </p:sp>
+      <p:sp>
+        <p:nvSpPr>
+          <p:cNvPr id="3" name="Content Placeholder 2"/>
+          <p:cNvSpPr>
+            <a:spLocks noGrp="1"/>
+          </p:cNvSpPr>
+          <p:nvPr>
+            <p:ph idx="1"/>
+          </p:nvPr>
+        </p:nvSpPr>
+        <p:spPr/>
+        <p:txBody>
+          <a:bodyPr>
+            <a:normAutofit lnSpcReduction="10000"/>
+          </a:bodyPr>
+          <a:lstStyle/>
+          <a:p>
+            <a:r>
+              <a:rPr lang="en-GB" dirty="0" smtClean="0"/>
+              <a:t>Classification of URLs prior to malware analysis currently not implemented.</a:t>
+            </a:r>
+          </a:p>
+          <a:p>
+            <a:r>
+              <a:rPr lang="en-GB" dirty="0" smtClean="0"/>
+              <a:t>Classification unnecessary if high-interaction scanning not used.</a:t>
+            </a:r>
+          </a:p>
+          <a:p>
+            <a:r>
+              <a:rPr lang="en-GB" dirty="0" smtClean="0"/>
+              <a:t>However it is possible to adapt a zero-low interaction malware scanner to perform classification.</a:t>
+            </a:r>
+          </a:p>
+          <a:p>
+            <a:pPr lvl="1"/>
+            <a:r>
+              <a:rPr lang="en-GB" dirty="0" smtClean="0"/>
+              <a:t>This can be achieved by separating high-interaction scanning tasks into another task group</a:t>
+            </a:r>
           </a:p>
         </p:txBody>
       </p:sp>
@@ -8723,31 +9454,10 @@
   <p:clrMapOvr>
     <a:masterClrMapping/>
   </p:clrMapOvr>
-  <p:transition spd="med"/>
   <p:timing>
     <p:tnLst>
       <p:par>
-        <p:cTn id="1" dur="indefinite" restart="never" nodeType="tmRoot">
-          <p:childTnLst>
-            <p:seq concurrent="1" nextAc="seek">
-              <p:cTn id="2" dur="0" nodeType="mainSeq"/>
-              <p:prevCondLst>
-                <p:cond evt="onPrev" delay="0">
-                  <p:tgtEl>
-                    <p:sldTgt/>
-                  </p:tgtEl>
-                </p:cond>
-              </p:prevCondLst>
-              <p:nextCondLst>
-                <p:cond evt="onNext" delay="0">
-                  <p:tgtEl>
-                    <p:sldTgt/>
-                  </p:tgtEl>
-                </p:cond>
-              </p:nextCondLst>
-            </p:seq>
-          </p:childTnLst>
-        </p:cTn>
+        <p:cTn id="1" dur="indefinite" restart="never" nodeType="tmRoot"/>
       </p:par>
     </p:tnLst>
   </p:timing>
@@ -8793,7 +9503,7 @@
       </p:grpSpPr>
       <p:sp>
         <p:nvSpPr>
-          <p:cNvPr id="4098" name="Rectangle 1"/>
+          <p:cNvPr id="3074" name="Rectangle 1"/>
           <p:cNvSpPr>
             <a:spLocks noGrp="1" noChangeArrowheads="1"/>
           </p:cNvSpPr>
@@ -8836,7 +9546,7 @@
       </p:sp>
       <p:sp>
         <p:nvSpPr>
-          <p:cNvPr id="4099" name="Rectangle 2"/>
+          <p:cNvPr id="4098" name="Rectangle 2"/>
           <p:cNvSpPr>
             <a:spLocks noGrp="1" noChangeArrowheads="1"/>
           </p:cNvSpPr>
@@ -8851,10 +9561,12 @@
           </a:xfrm>
         </p:spPr>
         <p:txBody>
-          <a:bodyPr/>
-          <a:lstStyle/>
-          <a:p>
-            <a:pPr marL="391686" indent="-293764">
+          <a:bodyPr>
+            <a:normAutofit lnSpcReduction="10000"/>
+          </a:bodyPr>
+          <a:lstStyle/>
+          <a:p>
+            <a:pPr marL="449287" indent="-260644">
               <a:buSzPct val="45000"/>
               <a:buFont typeface="Wingdings" charset="2"/>
               <a:buChar char=""/>
@@ -8875,14 +9587,30 @@
             </a:pPr>
             <a:r>
               <a:rPr lang="en-GB" dirty="0" smtClean="0"/>
-              <a:t>Low Interaction</a:t>
-            </a:r>
-          </a:p>
-          <a:p>
-            <a:pPr marL="783372" lvl="1" indent="-293764">
-              <a:buSzPct val="75000"/>
-              <a:buFont typeface="Symbol" charset="2"/>
-              <a:buChar char=""/>
+              <a:t>6 subsystems </a:t>
+            </a:r>
+            <a:r>
+              <a:rPr lang="en-GB" dirty="0" smtClean="0"/>
+              <a:t>using</a:t>
+            </a:r>
+            <a:r>
+              <a:rPr lang="en-GB" dirty="0" smtClean="0"/>
+              <a:t> </a:t>
+            </a:r>
+            <a:r>
+              <a:rPr lang="en-GB" dirty="0" smtClean="0"/>
+              <a:t>3 interaction </a:t>
+            </a:r>
+            <a:r>
+              <a:rPr lang="en-GB" dirty="0" smtClean="0"/>
+              <a:t>levels</a:t>
+            </a:r>
+          </a:p>
+          <a:p>
+            <a:pPr marL="449287" indent="-260644">
+              <a:buSzPct val="45000"/>
+              <a:buFont typeface="Wingdings" charset="2"/>
+              <a:buChar char=""/>
               <a:tabLst>
                 <a:tab pos="656650" algn="l"/>
                 <a:tab pos="1313299" algn="l"/>
@@ -8900,7 +9628,58 @@
             </a:pPr>
             <a:r>
               <a:rPr lang="en-GB" dirty="0" smtClean="0"/>
-              <a:t>HTML Analysis</a:t>
+              <a:t>Not all implemented subsystems are currently deployed</a:t>
+            </a:r>
+            <a:endParaRPr lang="en-GB" dirty="0" smtClean="0"/>
+          </a:p>
+          <a:p>
+            <a:pPr marL="449287" indent="-260644">
+              <a:buSzPct val="45000"/>
+              <a:buFont typeface="Wingdings" charset="2"/>
+              <a:buChar char=""/>
+              <a:tabLst>
+                <a:tab pos="656650" algn="l"/>
+                <a:tab pos="1313299" algn="l"/>
+                <a:tab pos="1969949" algn="l"/>
+                <a:tab pos="2626599" algn="l"/>
+                <a:tab pos="3283248" algn="l"/>
+                <a:tab pos="3939898" algn="l"/>
+                <a:tab pos="4596548" algn="l"/>
+                <a:tab pos="5253198" algn="l"/>
+                <a:tab pos="5909847" algn="l"/>
+                <a:tab pos="6566497" algn="l"/>
+                <a:tab pos="7223147" algn="l"/>
+                <a:tab pos="7879796" algn="l"/>
+              </a:tabLst>
+            </a:pPr>
+            <a:r>
+              <a:rPr lang="en-GB" dirty="0" smtClean="0"/>
+              <a:t>No Interaction</a:t>
+            </a:r>
+          </a:p>
+          <a:p>
+            <a:pPr marL="812172" lvl="1" indent="-260644">
+              <a:buSzPct val="45000"/>
+              <a:buFont typeface="Wingdings" charset="2"/>
+              <a:buChar char=""/>
+              <a:tabLst>
+                <a:tab pos="656650" algn="l"/>
+                <a:tab pos="1313299" algn="l"/>
+                <a:tab pos="1969949" algn="l"/>
+                <a:tab pos="2626599" algn="l"/>
+                <a:tab pos="3283248" algn="l"/>
+                <a:tab pos="3939898" algn="l"/>
+                <a:tab pos="4596548" algn="l"/>
+                <a:tab pos="5253198" algn="l"/>
+                <a:tab pos="5909847" algn="l"/>
+                <a:tab pos="6566497" algn="l"/>
+                <a:tab pos="7223147" algn="l"/>
+                <a:tab pos="7879796" algn="l"/>
+              </a:tabLst>
+            </a:pPr>
+            <a:r>
+              <a:rPr lang="en-GB" dirty="0" smtClean="0"/>
+              <a:t>URL Classification</a:t>
             </a:r>
           </a:p>
           <a:p>
@@ -8925,36 +9704,7 @@
             </a:pPr>
             <a:r>
               <a:rPr lang="en-GB" dirty="0" smtClean="0"/>
-              <a:t>Focus on the frequency of trending keywords in a webpage</a:t>
-            </a:r>
-          </a:p>
-          <a:p>
-            <a:pPr marL="783372" lvl="1" indent="-293764">
-              <a:buSzPct val="75000"/>
-              <a:buFont typeface="Symbol" charset="2"/>
-              <a:buChar char=""/>
-              <a:tabLst>
-                <a:tab pos="656650" algn="l"/>
-                <a:tab pos="1313299" algn="l"/>
-                <a:tab pos="1969949" algn="l"/>
-                <a:tab pos="2626599" algn="l"/>
-                <a:tab pos="3283248" algn="l"/>
-                <a:tab pos="3939898" algn="l"/>
-                <a:tab pos="4596548" algn="l"/>
-                <a:tab pos="5253198" algn="l"/>
-                <a:tab pos="5909847" algn="l"/>
-                <a:tab pos="6566497" algn="l"/>
-                <a:tab pos="7223147" algn="l"/>
-                <a:tab pos="7879796" algn="l"/>
-              </a:tabLst>
-            </a:pPr>
-            <a:r>
-              <a:rPr lang="en-GB" dirty="0" err="1" smtClean="0"/>
-              <a:t>ClamAV</a:t>
-            </a:r>
-            <a:r>
-              <a:rPr lang="en-GB" dirty="0" smtClean="0"/>
-              <a:t> Malware Scan</a:t>
+              <a:t>Calculate the probability of a page having malware</a:t>
             </a:r>
           </a:p>
           <a:p>
@@ -8979,7 +9729,7 @@
             </a:pPr>
             <a:r>
               <a:rPr lang="en-GB" dirty="0" smtClean="0"/>
-              <a:t>Signature based detection</a:t>
+              <a:t>From history of other pages, stored in a database</a:t>
             </a:r>
           </a:p>
           <a:p>
@@ -9004,20 +9754,109 @@
             </a:pPr>
             <a:r>
               <a:rPr lang="en-GB" dirty="0" smtClean="0"/>
-              <a:t>Scans </a:t>
-            </a:r>
-            <a:r>
-              <a:rPr lang="en-GB" dirty="0" smtClean="0"/>
-              <a:t>web pages </a:t>
-            </a:r>
-            <a:r>
-              <a:rPr lang="en-GB" dirty="0" smtClean="0"/>
-              <a:t>and </a:t>
-            </a:r>
-            <a:r>
-              <a:rPr lang="en-GB" dirty="0" smtClean="0"/>
-              <a:t>downloadable objects</a:t>
-            </a:r>
+              <a:t>And the other no interaction scanners</a:t>
+            </a:r>
+          </a:p>
+          <a:p>
+            <a:pPr marL="812172" lvl="1" indent="-260644">
+              <a:buSzPct val="45000"/>
+              <a:buFont typeface="Wingdings" charset="2"/>
+              <a:buChar char=""/>
+              <a:tabLst>
+                <a:tab pos="656650" algn="l"/>
+                <a:tab pos="1313299" algn="l"/>
+                <a:tab pos="1969949" algn="l"/>
+                <a:tab pos="2626599" algn="l"/>
+                <a:tab pos="3283248" algn="l"/>
+                <a:tab pos="3939898" algn="l"/>
+                <a:tab pos="4596548" algn="l"/>
+                <a:tab pos="5253198" algn="l"/>
+                <a:tab pos="5909847" algn="l"/>
+                <a:tab pos="6566497" algn="l"/>
+                <a:tab pos="7223147" algn="l"/>
+                <a:tab pos="7879796" algn="l"/>
+              </a:tabLst>
+            </a:pPr>
+            <a:r>
+              <a:rPr lang="en-GB" dirty="0" smtClean="0"/>
+              <a:t>Malware List Scanners</a:t>
+            </a:r>
+          </a:p>
+          <a:p>
+            <a:pPr marL="1175057" lvl="2" indent="-260644">
+              <a:buSzPct val="45000"/>
+              <a:buFont typeface="Wingdings" charset="2"/>
+              <a:buChar char=""/>
+              <a:tabLst>
+                <a:tab pos="656650" algn="l"/>
+                <a:tab pos="1313299" algn="l"/>
+                <a:tab pos="1969949" algn="l"/>
+                <a:tab pos="2626599" algn="l"/>
+                <a:tab pos="3283248" algn="l"/>
+                <a:tab pos="3939898" algn="l"/>
+                <a:tab pos="4596548" algn="l"/>
+                <a:tab pos="5253198" algn="l"/>
+                <a:tab pos="5909847" algn="l"/>
+                <a:tab pos="6566497" algn="l"/>
+                <a:tab pos="7223147" algn="l"/>
+                <a:tab pos="7879796" algn="l"/>
+              </a:tabLst>
+            </a:pPr>
+            <a:r>
+              <a:rPr lang="en-GB" dirty="0" smtClean="0"/>
+              <a:t>Uses </a:t>
+            </a:r>
+            <a:r>
+              <a:rPr lang="en-GB" dirty="0" err="1" smtClean="0"/>
+              <a:t>Alexa</a:t>
+            </a:r>
+            <a:r>
+              <a:rPr lang="en-GB" dirty="0" smtClean="0"/>
+              <a:t> and WOT (Web Of Trust)</a:t>
+            </a:r>
+          </a:p>
+          <a:p>
+            <a:pPr marL="1175057" lvl="2" indent="-260644">
+              <a:buSzPct val="45000"/>
+              <a:buFont typeface="Wingdings" charset="2"/>
+              <a:buChar char=""/>
+              <a:tabLst>
+                <a:tab pos="656650" algn="l"/>
+                <a:tab pos="1313299" algn="l"/>
+                <a:tab pos="1969949" algn="l"/>
+                <a:tab pos="2626599" algn="l"/>
+                <a:tab pos="3283248" algn="l"/>
+                <a:tab pos="3939898" algn="l"/>
+                <a:tab pos="4596548" algn="l"/>
+                <a:tab pos="5253198" algn="l"/>
+                <a:tab pos="5909847" algn="l"/>
+                <a:tab pos="6566497" algn="l"/>
+                <a:tab pos="7223147" algn="l"/>
+                <a:tab pos="7879796" algn="l"/>
+              </a:tabLst>
+            </a:pPr>
+            <a:endParaRPr lang="en-GB" dirty="0" smtClean="0"/>
+          </a:p>
+          <a:p>
+            <a:pPr marL="812172" lvl="1" indent="-260644">
+              <a:buSzPct val="75000"/>
+              <a:buFont typeface="Symbol" charset="2"/>
+              <a:buChar char=""/>
+              <a:tabLst>
+                <a:tab pos="656650" algn="l"/>
+                <a:tab pos="1313299" algn="l"/>
+                <a:tab pos="1969949" algn="l"/>
+                <a:tab pos="2626599" algn="l"/>
+                <a:tab pos="3283248" algn="l"/>
+                <a:tab pos="3939898" algn="l"/>
+                <a:tab pos="4596548" algn="l"/>
+                <a:tab pos="5253198" algn="l"/>
+                <a:tab pos="5909847" algn="l"/>
+                <a:tab pos="6566497" algn="l"/>
+                <a:tab pos="7223147" algn="l"/>
+                <a:tab pos="7879796" algn="l"/>
+              </a:tabLst>
+            </a:pPr>
             <a:endParaRPr lang="en-GB" dirty="0" smtClean="0"/>
           </a:p>
         </p:txBody>

</xml_diff>

<commit_message>
Added final plan to presentation
</commit_message>
<xml_diff>
--- a/doc/pres3/wk12-progress.pptx
+++ b/doc/pres3/wk12-progress.pptx
@@ -236,7 +236,7 @@
             <a:fld id="{18F98EB7-082C-9949-BFCA-B4BAD2D6FDBD}" type="datetimeFigureOut">
               <a:rPr lang="en-US" smtClean="0"/>
               <a:pPr/>
-              <a:t>1/8/2013</a:t>
+              <a:t>1/9/2013</a:t>
             </a:fld>
             <a:endParaRPr lang="en-US"/>
           </a:p>
@@ -312,7 +312,7 @@
     </p:spTree>
     <p:extLst>
       <p:ext uri="{BB962C8B-B14F-4D97-AF65-F5344CB8AC3E}">
-        <p14:creationId xmlns="" xmlns:p14="http://schemas.microsoft.com/office/powerpoint/2010/main" val="1901348598"/>
+        <p14:creationId xmlns:p14="http://schemas.microsoft.com/office/powerpoint/2010/main" xmlns="" val="1901348598"/>
       </p:ext>
     </p:extLst>
   </p:cSld>
@@ -403,7 +403,7 @@
             <a:fld id="{5C465251-34BA-484B-BD29-7371F8FBFAE2}" type="datetimeFigureOut">
               <a:rPr lang="en-GB" smtClean="0"/>
               <a:pPr/>
-              <a:t>08/01/2013</a:t>
+              <a:t>09/01/2013</a:t>
             </a:fld>
             <a:endParaRPr lang="en-GB"/>
           </a:p>
@@ -574,7 +574,7 @@
     </p:spTree>
     <p:extLst>
       <p:ext uri="{BB962C8B-B14F-4D97-AF65-F5344CB8AC3E}">
-        <p14:creationId xmlns="" xmlns:p14="http://schemas.microsoft.com/office/powerpoint/2010/main" val="1219798393"/>
+        <p14:creationId xmlns:p14="http://schemas.microsoft.com/office/powerpoint/2010/main" xmlns="" val="1219798393"/>
       </p:ext>
     </p:extLst>
   </p:cSld>
@@ -1700,7 +1700,7 @@
             <a:fld id="{9B2BCD74-F7F5-4BD6-83D7-1EBC56D75222}" type="datetimeFigureOut">
               <a:rPr lang="en-GB" smtClean="0"/>
               <a:pPr/>
-              <a:t>08/01/2013</a:t>
+              <a:t>09/01/2013</a:t>
             </a:fld>
             <a:endParaRPr lang="en-GB"/>
           </a:p>
@@ -1874,7 +1874,7 @@
             <a:fld id="{9B2BCD74-F7F5-4BD6-83D7-1EBC56D75222}" type="datetimeFigureOut">
               <a:rPr lang="en-GB" smtClean="0"/>
               <a:pPr/>
-              <a:t>08/01/2013</a:t>
+              <a:t>09/01/2013</a:t>
             </a:fld>
             <a:endParaRPr lang="en-GB"/>
           </a:p>
@@ -2051,7 +2051,7 @@
             <a:fld id="{9B2BCD74-F7F5-4BD6-83D7-1EBC56D75222}" type="datetimeFigureOut">
               <a:rPr lang="en-GB" smtClean="0"/>
               <a:pPr/>
-              <a:t>08/01/2013</a:t>
+              <a:t>09/01/2013</a:t>
             </a:fld>
             <a:endParaRPr lang="en-GB"/>
           </a:p>
@@ -2218,7 +2218,7 @@
             <a:fld id="{9B2BCD74-F7F5-4BD6-83D7-1EBC56D75222}" type="datetimeFigureOut">
               <a:rPr lang="en-GB" smtClean="0"/>
               <a:pPr/>
-              <a:t>08/01/2013</a:t>
+              <a:t>09/01/2013</a:t>
             </a:fld>
             <a:endParaRPr lang="en-GB"/>
           </a:p>
@@ -2461,7 +2461,7 @@
             <a:fld id="{9B2BCD74-F7F5-4BD6-83D7-1EBC56D75222}" type="datetimeFigureOut">
               <a:rPr lang="en-GB" smtClean="0"/>
               <a:pPr/>
-              <a:t>08/01/2013</a:t>
+              <a:t>09/01/2013</a:t>
             </a:fld>
             <a:endParaRPr lang="en-GB"/>
           </a:p>
@@ -2746,7 +2746,7 @@
             <a:fld id="{9B2BCD74-F7F5-4BD6-83D7-1EBC56D75222}" type="datetimeFigureOut">
               <a:rPr lang="en-GB" smtClean="0"/>
               <a:pPr/>
-              <a:t>08/01/2013</a:t>
+              <a:t>09/01/2013</a:t>
             </a:fld>
             <a:endParaRPr lang="en-GB"/>
           </a:p>
@@ -3165,7 +3165,7 @@
             <a:fld id="{9B2BCD74-F7F5-4BD6-83D7-1EBC56D75222}" type="datetimeFigureOut">
               <a:rPr lang="en-GB" smtClean="0"/>
               <a:pPr/>
-              <a:t>08/01/2013</a:t>
+              <a:t>09/01/2013</a:t>
             </a:fld>
             <a:endParaRPr lang="en-GB"/>
           </a:p>
@@ -3280,7 +3280,7 @@
             <a:fld id="{9B2BCD74-F7F5-4BD6-83D7-1EBC56D75222}" type="datetimeFigureOut">
               <a:rPr lang="en-GB" smtClean="0"/>
               <a:pPr/>
-              <a:t>08/01/2013</a:t>
+              <a:t>09/01/2013</a:t>
             </a:fld>
             <a:endParaRPr lang="en-GB"/>
           </a:p>
@@ -3372,7 +3372,7 @@
             <a:fld id="{9B2BCD74-F7F5-4BD6-83D7-1EBC56D75222}" type="datetimeFigureOut">
               <a:rPr lang="en-GB" smtClean="0"/>
               <a:pPr/>
-              <a:t>08/01/2013</a:t>
+              <a:t>09/01/2013</a:t>
             </a:fld>
             <a:endParaRPr lang="en-GB"/>
           </a:p>
@@ -3646,7 +3646,7 @@
             <a:fld id="{9B2BCD74-F7F5-4BD6-83D7-1EBC56D75222}" type="datetimeFigureOut">
               <a:rPr lang="en-GB" smtClean="0"/>
               <a:pPr/>
-              <a:t>08/01/2013</a:t>
+              <a:t>09/01/2013</a:t>
             </a:fld>
             <a:endParaRPr lang="en-GB"/>
           </a:p>
@@ -3896,7 +3896,7 @@
             <a:fld id="{9B2BCD74-F7F5-4BD6-83D7-1EBC56D75222}" type="datetimeFigureOut">
               <a:rPr lang="en-GB" smtClean="0"/>
               <a:pPr/>
-              <a:t>08/01/2013</a:t>
+              <a:t>09/01/2013</a:t>
             </a:fld>
             <a:endParaRPr lang="en-GB"/>
           </a:p>
@@ -4121,7 +4121,7 @@
             <a:fld id="{9B2BCD74-F7F5-4BD6-83D7-1EBC56D75222}" type="datetimeFigureOut">
               <a:rPr lang="en-GB" smtClean="0"/>
               <a:pPr/>
-              <a:t>08/01/2013</a:t>
+              <a:t>09/01/2013</a:t>
             </a:fld>
             <a:endParaRPr lang="en-GB"/>
           </a:p>
@@ -5201,7 +5201,15 @@
             </a:pPr>
             <a:r>
               <a:rPr lang="en-GB" dirty="0" smtClean="0"/>
-              <a:t>Resource saving, high URL throughput</a:t>
+              <a:t>Resource saving, </a:t>
+            </a:r>
+            <a:r>
+              <a:rPr lang="en-GB" dirty="0" smtClean="0"/>
+              <a:t>higher </a:t>
+            </a:r>
+            <a:r>
+              <a:rPr lang="en-GB" dirty="0" smtClean="0"/>
+              <a:t>URL throughput</a:t>
             </a:r>
           </a:p>
         </p:txBody>
@@ -5333,7 +5341,6 @@
               <a:rPr lang="en-GB" dirty="0" smtClean="0"/>
               <a:t>Not enough execution time to test hypothesis of trending topics correlating with malware.</a:t>
             </a:r>
-            <a:endParaRPr lang="en-GB" dirty="0" smtClean="0"/>
           </a:p>
         </p:txBody>
       </p:sp>
@@ -5436,7 +5443,6 @@
               <a:rPr lang="en-GB" dirty="0" smtClean="0"/>
               <a:t>To test the framework as a whole, a set of risky topics were created:</a:t>
             </a:r>
-            <a:endParaRPr lang="en-GB" dirty="0" smtClean="0"/>
           </a:p>
         </p:txBody>
       </p:sp>
@@ -5601,11 +5607,7 @@
           <a:p>
             <a:r>
               <a:rPr lang="en-GB" dirty="0" smtClean="0"/>
-              <a:t>Conclusions</a:t>
-            </a:r>
-            <a:r>
-              <a:rPr lang="en-GB" dirty="0" smtClean="0"/>
-              <a:t>: Malware Found</a:t>
+              <a:t>Conclusions: Malware Found</a:t>
             </a:r>
             <a:endParaRPr lang="en-GB" dirty="0"/>
           </a:p>
@@ -5650,11 +5652,7 @@
             </a:pPr>
             <a:r>
               <a:rPr lang="en-GB" dirty="0" smtClean="0"/>
-              <a:t>{</a:t>
-            </a:r>
-            <a:r>
-              <a:rPr lang="en-GB" dirty="0" smtClean="0"/>
-              <a:t>'stream': ('FOUND', 'winnow.botnet.ff.trojans.3793.UNOFFICIAL')}</a:t>
+              <a:t>{'stream': ('FOUND', 'winnow.botnet.ff.trojans.3793.UNOFFICIAL')}</a:t>
             </a:r>
           </a:p>
           <a:p>
@@ -5663,11 +5661,7 @@
             </a:pPr>
             <a:r>
               <a:rPr lang="en-GB" dirty="0" smtClean="0"/>
-              <a:t>	http</a:t>
-            </a:r>
-            <a:r>
-              <a:rPr lang="en-GB" dirty="0" smtClean="0"/>
-              <a:t>://torrentz.eu/fb520fd9034543027172918dc430a171324fceff</a:t>
+              <a:t>	http://torrentz.eu/fb520fd9034543027172918dc430a171324fceff</a:t>
             </a:r>
           </a:p>
           <a:p>
@@ -5676,11 +5670,7 @@
             </a:pPr>
             <a:r>
               <a:rPr lang="en-GB" dirty="0" smtClean="0"/>
-              <a:t>{</a:t>
-            </a:r>
-            <a:r>
-              <a:rPr lang="en-GB" dirty="0" smtClean="0"/>
-              <a:t>'stream': ('FOUND', 'winnow.botnet.ff.trojans.3793.UNOFFICIAL')}</a:t>
+              <a:t>{'stream': ('FOUND', 'winnow.botnet.ff.trojans.3793.UNOFFICIAL')}</a:t>
             </a:r>
           </a:p>
           <a:p>
@@ -5689,11 +5679,7 @@
             </a:pPr>
             <a:r>
               <a:rPr lang="en-GB" dirty="0" smtClean="0"/>
-              <a:t>	http</a:t>
-            </a:r>
-            <a:r>
-              <a:rPr lang="en-GB" dirty="0" smtClean="0"/>
-              <a:t>://torrentz.eu/fe0a2b3e3240cb2652f15bec706b160678472b79</a:t>
+              <a:t>	http://torrentz.eu/fe0a2b3e3240cb2652f15bec706b160678472b79</a:t>
             </a:r>
           </a:p>
           <a:p>
@@ -5702,11 +5688,7 @@
             </a:pPr>
             <a:r>
               <a:rPr lang="en-GB" dirty="0" smtClean="0"/>
-              <a:t>{</a:t>
-            </a:r>
-            <a:r>
-              <a:rPr lang="en-GB" dirty="0" smtClean="0"/>
-              <a:t>'stream': ('FOUND', 'winnow.botnet.ff.trojans.3793.UNOFFICIAL')}</a:t>
+              <a:t>{'stream': ('FOUND', 'winnow.botnet.ff.trojans.3793.UNOFFICIAL')}</a:t>
             </a:r>
           </a:p>
           <a:p>
@@ -5715,11 +5697,7 @@
             </a:pPr>
             <a:r>
               <a:rPr lang="en-GB" dirty="0" smtClean="0"/>
-              <a:t>	http</a:t>
-            </a:r>
-            <a:r>
-              <a:rPr lang="en-GB" dirty="0" smtClean="0"/>
-              <a:t>://torrentz.eu/2f3a1f3ea8d643a741b52349294cb729a99f553a</a:t>
+              <a:t>	http://torrentz.eu/2f3a1f3ea8d643a741b52349294cb729a99f553a</a:t>
             </a:r>
           </a:p>
           <a:p>
@@ -5728,11 +5706,7 @@
             </a:pPr>
             <a:r>
               <a:rPr lang="en-GB" dirty="0" smtClean="0"/>
-              <a:t>{</a:t>
-            </a:r>
-            <a:r>
-              <a:rPr lang="en-GB" dirty="0" smtClean="0"/>
-              <a:t>'stream': ('FOUND', 'winnow.malware.m0.malware.740032.UNOFFICIAL')}</a:t>
+              <a:t>{'stream': ('FOUND', 'winnow.malware.m0.malware.740032.UNOFFICIAL')}</a:t>
             </a:r>
           </a:p>
           <a:p>
@@ -5741,15 +5715,7 @@
             </a:pPr>
             <a:r>
               <a:rPr lang="en-GB" dirty="0" smtClean="0"/>
-              <a:t>	http</a:t>
-            </a:r>
-            <a:r>
-              <a:rPr lang="en-GB" dirty="0" smtClean="0"/>
-              <a:t>://</a:t>
-            </a:r>
-            <a:r>
-              <a:rPr lang="en-GB" dirty="0" smtClean="0"/>
-              <a:t>www.egydown.com/35666-euro-truck-simulator-2-pc-fightclub.html</a:t>
+              <a:t>	http://www.egydown.com/35666-euro-truck-simulator-2-pc-fightclub.html</a:t>
             </a:r>
           </a:p>
           <a:p>
@@ -5758,15 +5724,7 @@
             </a:pPr>
             <a:r>
               <a:rPr lang="en-GB" dirty="0" smtClean="0"/>
-              <a:t>{</a:t>
-            </a:r>
-            <a:r>
-              <a:rPr lang="en-GB" dirty="0" smtClean="0"/>
-              <a:t>'stream': ('FOUND', </a:t>
-            </a:r>
-            <a:r>
-              <a:rPr lang="en-GB" dirty="0" smtClean="0"/>
-              <a:t>'Win.Trojan.8060046-1')}</a:t>
+              <a:t>{'stream': ('FOUND', 'Win.Trojan.8060046-1')}</a:t>
             </a:r>
           </a:p>
           <a:p>
@@ -5775,15 +5733,7 @@
             </a:pPr>
             <a:r>
               <a:rPr lang="en-GB" dirty="0" smtClean="0"/>
-              <a:t>	</a:t>
-            </a:r>
-            <a:r>
-              <a:rPr lang="en-GB" dirty="0" smtClean="0"/>
-              <a:t>https</a:t>
-            </a:r>
-            <a:r>
-              <a:rPr lang="en-GB" dirty="0" smtClean="0"/>
-              <a:t>://dl.dropbox.com/u/85684172/FreeYouTubeDownloaderInstallerFull.exe</a:t>
+              <a:t>	https://dl.dropbox.com/u/85684172/FreeYouTubeDownloaderInstallerFull.exe</a:t>
             </a:r>
           </a:p>
         </p:txBody>
@@ -5857,11 +5807,7 @@
           <a:p>
             <a:r>
               <a:rPr lang="en-GB" dirty="0" smtClean="0"/>
-              <a:t>Conclusions</a:t>
-            </a:r>
-            <a:r>
-              <a:rPr lang="en-GB" dirty="0" smtClean="0"/>
-              <a:t>: Testing Trends</a:t>
+              <a:t>Conclusions: Testing Trends</a:t>
             </a:r>
             <a:endParaRPr lang="en-GB" dirty="0"/>
           </a:p>
@@ -6439,11 +6385,7 @@
             <a:pPr lvl="1"/>
             <a:r>
               <a:rPr lang="en-GB" dirty="0" smtClean="0"/>
-              <a:t>Malware </a:t>
-            </a:r>
-            <a:r>
-              <a:rPr lang="en-GB" dirty="0" smtClean="0"/>
-              <a:t>Analysis</a:t>
+              <a:t>Malware Analysis</a:t>
             </a:r>
           </a:p>
           <a:p>
@@ -6457,7 +6399,6 @@
               <a:rPr lang="en-GB" dirty="0" smtClean="0"/>
               <a:t>Planning</a:t>
             </a:r>
-            <a:endParaRPr lang="en-GB" dirty="0" smtClean="0"/>
           </a:p>
           <a:p>
             <a:r>
@@ -6476,7 +6417,6 @@
               <a:rPr lang="en-GB" dirty="0" smtClean="0"/>
               <a:t>Comparison with similar systems</a:t>
             </a:r>
-            <a:endParaRPr lang="en-GB" dirty="0" smtClean="0"/>
           </a:p>
           <a:p>
             <a:r>
@@ -6489,7 +6429,6 @@
               <a:rPr lang="en-GB" dirty="0" smtClean="0"/>
               <a:t>Questions</a:t>
             </a:r>
-            <a:endParaRPr lang="en-GB" dirty="0" smtClean="0"/>
           </a:p>
         </p:txBody>
       </p:sp>
@@ -6709,7 +6648,7 @@
       </p:graphicFrame>
       <p:pic>
         <p:nvPicPr>
-          <p:cNvPr id="6" name="Picture 5" descr="l1plan.png"/>
+          <p:cNvPr id="5" name="Picture 4" descr="l1plan-final.png"/>
           <p:cNvPicPr>
             <a:picLocks noChangeAspect="1"/>
           </p:cNvPicPr>
@@ -6723,8 +6662,8 @@
         </p:blipFill>
         <p:spPr>
           <a:xfrm>
-            <a:off x="251520" y="1556792"/>
-            <a:ext cx="8696821" cy="4033681"/>
+            <a:off x="179512" y="1586680"/>
+            <a:ext cx="8784976" cy="4074568"/>
           </a:xfrm>
           <a:prstGeom prst="rect">
             <a:avLst/>
@@ -8866,9 +8805,6 @@
               </a:rPr>
               <a:t>Callback from Task returned to parent Task when child Tasks are complete</a:t>
             </a:r>
-            <a:endParaRPr lang="en-US" dirty="0" smtClean="0">
-              <a:latin typeface="+mn-lt"/>
-            </a:endParaRPr>
           </a:p>
           <a:p>
             <a:pPr lvl="1"/>
@@ -9587,23 +9523,7 @@
             </a:pPr>
             <a:r>
               <a:rPr lang="en-GB" dirty="0" smtClean="0"/>
-              <a:t>6 subsystems </a:t>
-            </a:r>
-            <a:r>
-              <a:rPr lang="en-GB" dirty="0" smtClean="0"/>
-              <a:t>using</a:t>
-            </a:r>
-            <a:r>
-              <a:rPr lang="en-GB" dirty="0" smtClean="0"/>
-              <a:t> </a:t>
-            </a:r>
-            <a:r>
-              <a:rPr lang="en-GB" dirty="0" smtClean="0"/>
-              <a:t>3 interaction </a:t>
-            </a:r>
-            <a:r>
-              <a:rPr lang="en-GB" dirty="0" smtClean="0"/>
-              <a:t>levels</a:t>
+              <a:t>6 subsystems using 3 interaction levels</a:t>
             </a:r>
           </a:p>
           <a:p>
@@ -9630,7 +9550,6 @@
               <a:rPr lang="en-GB" dirty="0" smtClean="0"/>
               <a:t>Not all implemented subsystems are currently deployed</a:t>
             </a:r>
-            <a:endParaRPr lang="en-GB" dirty="0" smtClean="0"/>
           </a:p>
           <a:p>
             <a:pPr marL="449287" indent="-260644">

</xml_diff>